<commit_message>
pp update + new latex
</commit_message>
<xml_diff>
--- a/Document/PresentazioneProgetto.pptx
+++ b/Document/PresentazioneProgetto.pptx
@@ -11,7 +11,6 @@
     <p:sldId id="259" r:id="rId5"/>
     <p:sldId id="260" r:id="rId6"/>
     <p:sldId id="262" r:id="rId7"/>
-    <p:sldId id="261" r:id="rId8"/>
   </p:sldIdLst>
   <p:sldSz cx="12192000" cy="6858000"/>
   <p:notesSz cx="6858000" cy="9144000"/>
@@ -21876,7 +21875,7 @@
           <a:p>
             <a:r>
               <a:rPr lang="it-IT" dirty="0"/>
-              <a:t>Tempi negativi corrispondono a un decremento successivo in quanto si annulla.</a:t>
+              <a:t>per ogni tempo negativo esiste un tempo positivo uguale in modulo che, al sommare i tempi delle stesse attività, si annullano a vicenda.</a:t>
             </a:r>
           </a:p>
           <a:p>
@@ -21939,12 +21938,8 @@
           <a:lstStyle/>
           <a:p>
             <a:r>
-              <a:rPr lang="it-IT" dirty="0"/>
-              <a:t>Esecuzione </a:t>
-            </a:r>
-            <a:r>
               <a:rPr lang="it-IT"/>
-              <a:t>degli scostamenti</a:t>
+              <a:t>Esecuzione degli scostamenti</a:t>
             </a:r>
           </a:p>
         </p:txBody>
@@ -21965,14 +21960,14 @@
             <p:ph idx="1"/>
             <p:extLst>
               <p:ext uri="{D42A27DB-BD31-4B8C-83A1-F6EECF244321}">
-                <p14:modId xmlns:p14="http://schemas.microsoft.com/office/powerpoint/2010/main" val="2216293827"/>
+                <p14:modId xmlns:p14="http://schemas.microsoft.com/office/powerpoint/2010/main" val="1036798793"/>
               </p:ext>
             </p:extLst>
           </p:nvPr>
         </p:nvGraphicFramePr>
         <p:xfrm>
-          <a:off x="1023938" y="2286000"/>
-          <a:ext cx="9720260" cy="741680"/>
+          <a:off x="200721" y="2084832"/>
+          <a:ext cx="11809141" cy="3802730"/>
         </p:xfrm>
         <a:graphic>
           <a:graphicData uri="http://schemas.openxmlformats.org/drawingml/2006/table">
@@ -21981,41 +21976,88 @@
                 <a:tableStyleId>{5C22544A-7EE6-4342-B048-85BDC9FD1C3A}</a:tableStyleId>
               </a:tblPr>
               <a:tblGrid>
-                <a:gridCol w="2430065">
+                <a:gridCol w="1312127">
+                  <a:extLst>
+                    <a:ext uri="{9D8B030D-6E8A-4147-A177-3AD203B41FA5}">
+                      <a16:colId xmlns:a16="http://schemas.microsoft.com/office/drawing/2014/main" val="3039533413"/>
+                    </a:ext>
+                  </a:extLst>
+                </a:gridCol>
+                <a:gridCol w="1364167">
                   <a:extLst>
                     <a:ext uri="{9D8B030D-6E8A-4147-A177-3AD203B41FA5}">
                       <a16:colId xmlns:a16="http://schemas.microsoft.com/office/drawing/2014/main" val="1628745461"/>
                     </a:ext>
                   </a:extLst>
                 </a:gridCol>
-                <a:gridCol w="2430065">
+                <a:gridCol w="1260085">
+                  <a:extLst>
+                    <a:ext uri="{9D8B030D-6E8A-4147-A177-3AD203B41FA5}">
+                      <a16:colId xmlns:a16="http://schemas.microsoft.com/office/drawing/2014/main" val="3012836848"/>
+                    </a:ext>
+                  </a:extLst>
+                </a:gridCol>
+                <a:gridCol w="1315846">
                   <a:extLst>
                     <a:ext uri="{9D8B030D-6E8A-4147-A177-3AD203B41FA5}">
                       <a16:colId xmlns:a16="http://schemas.microsoft.com/office/drawing/2014/main" val="3335112797"/>
                     </a:ext>
                   </a:extLst>
                 </a:gridCol>
-                <a:gridCol w="2430065">
+                <a:gridCol w="1308408">
+                  <a:extLst>
+                    <a:ext uri="{9D8B030D-6E8A-4147-A177-3AD203B41FA5}">
+                      <a16:colId xmlns:a16="http://schemas.microsoft.com/office/drawing/2014/main" val="3262263587"/>
+                    </a:ext>
+                  </a:extLst>
+                </a:gridCol>
+                <a:gridCol w="1367885">
                   <a:extLst>
                     <a:ext uri="{9D8B030D-6E8A-4147-A177-3AD203B41FA5}">
                       <a16:colId xmlns:a16="http://schemas.microsoft.com/office/drawing/2014/main" val="3015288968"/>
                     </a:ext>
                   </a:extLst>
                 </a:gridCol>
-                <a:gridCol w="2430065">
+                <a:gridCol w="1315844">
+                  <a:extLst>
+                    <a:ext uri="{9D8B030D-6E8A-4147-A177-3AD203B41FA5}">
+                      <a16:colId xmlns:a16="http://schemas.microsoft.com/office/drawing/2014/main" val="3807841347"/>
+                    </a:ext>
+                  </a:extLst>
+                </a:gridCol>
+                <a:gridCol w="1252652">
                   <a:extLst>
                     <a:ext uri="{9D8B030D-6E8A-4147-A177-3AD203B41FA5}">
                       <a16:colId xmlns:a16="http://schemas.microsoft.com/office/drawing/2014/main" val="3378513636"/>
                     </a:ext>
                   </a:extLst>
                 </a:gridCol>
+                <a:gridCol w="1312127">
+                  <a:extLst>
+                    <a:ext uri="{9D8B030D-6E8A-4147-A177-3AD203B41FA5}">
+                      <a16:colId xmlns:a16="http://schemas.microsoft.com/office/drawing/2014/main" val="1681983959"/>
+                    </a:ext>
+                  </a:extLst>
+                </a:gridCol>
               </a:tblGrid>
-              <a:tr h="370840">
+              <a:tr h="1149022">
                 <a:tc>
                   <a:txBody>
                     <a:bodyPr/>
                     <a:lstStyle/>
                     <a:p>
+                      <a:pPr algn="l"/>
+                      <a:endParaRPr lang="it-IT" dirty="0"/>
+                    </a:p>
+                  </a:txBody>
+                  <a:tcPr/>
+                </a:tc>
+                <a:tc>
+                  <a:txBody>
+                    <a:bodyPr/>
+                    <a:lstStyle/>
+                    <a:p>
+                      <a:pPr algn="l"/>
                       <a:r>
                         <a:rPr lang="it-IT" dirty="0"/>
                         <a:t>Budget</a:t>
@@ -22029,6 +22071,21 @@
                     <a:bodyPr/>
                     <a:lstStyle/>
                     <a:p>
+                      <a:pPr algn="l"/>
+                      <a:r>
+                        <a:rPr lang="it-IT" dirty="0"/>
+                        <a:t>Scostamento di volume</a:t>
+                      </a:r>
+                    </a:p>
+                  </a:txBody>
+                  <a:tcPr/>
+                </a:tc>
+                <a:tc>
+                  <a:txBody>
+                    <a:bodyPr/>
+                    <a:lstStyle/>
+                    <a:p>
+                      <a:pPr algn="l"/>
                       <a:r>
                         <a:rPr lang="it-IT" dirty="0"/>
                         <a:t>Standard</a:t>
@@ -22042,6 +22099,21 @@
                     <a:bodyPr/>
                     <a:lstStyle/>
                     <a:p>
+                      <a:pPr algn="l"/>
+                      <a:r>
+                        <a:rPr lang="it-IT" dirty="0"/>
+                        <a:t>Scostamento di impiego</a:t>
+                      </a:r>
+                    </a:p>
+                  </a:txBody>
+                  <a:tcPr/>
+                </a:tc>
+                <a:tc>
+                  <a:txBody>
+                    <a:bodyPr/>
+                    <a:lstStyle/>
+                    <a:p>
+                      <a:pPr algn="l"/>
                       <a:r>
                         <a:rPr lang="it-IT" dirty="0"/>
                         <a:t>Effettivo</a:t>
@@ -22055,10 +22127,40 @@
                     <a:bodyPr/>
                     <a:lstStyle/>
                     <a:p>
+                      <a:pPr algn="l"/>
+                      <a:r>
+                        <a:rPr lang="it-IT" dirty="0"/>
+                        <a:t>Scostamento di prezzo</a:t>
+                      </a:r>
+                    </a:p>
+                  </a:txBody>
+                  <a:tcPr/>
+                </a:tc>
+                <a:tc>
+                  <a:txBody>
+                    <a:bodyPr/>
+                    <a:lstStyle/>
+                    <a:p>
+                      <a:pPr algn="l"/>
                       <a:r>
                         <a:rPr lang="it-IT" dirty="0"/>
                         <a:t>Consuntivo</a:t>
                       </a:r>
+                    </a:p>
+                  </a:txBody>
+                  <a:tcPr/>
+                </a:tc>
+                <a:tc>
+                  <a:txBody>
+                    <a:bodyPr/>
+                    <a:lstStyle/>
+                    <a:p>
+                      <a:pPr algn="l"/>
+                      <a:r>
+                        <a:rPr lang="it-IT"/>
+                        <a:t>Scostamento consuntivo- budget</a:t>
+                      </a:r>
+                      <a:endParaRPr lang="it-IT" dirty="0"/>
                     </a:p>
                   </a:txBody>
                   <a:tcPr/>
@@ -22069,12 +22171,75 @@
                   </a:ext>
                 </a:extLst>
               </a:tr>
-              <a:tr h="370840">
+              <a:tr h="730300">
                 <a:tc>
                   <a:txBody>
                     <a:bodyPr/>
                     <a:lstStyle/>
                     <a:p>
+                      <a:pPr algn="l"/>
+                      <a:r>
+                        <a:rPr lang="it-IT"/>
+                        <a:t>Vendite</a:t>
+                      </a:r>
+                      <a:endParaRPr lang="it-IT" dirty="0"/>
+                    </a:p>
+                  </a:txBody>
+                  <a:tcPr/>
+                </a:tc>
+                <a:tc>
+                  <a:txBody>
+                    <a:bodyPr/>
+                    <a:lstStyle/>
+                    <a:p>
+                      <a:pPr algn="l"/>
+                      <a:r>
+                        <a:rPr lang="it-IT" dirty="0"/>
+                        <a:t>395.335,89</a:t>
+                      </a:r>
+                    </a:p>
+                  </a:txBody>
+                  <a:tcPr/>
+                </a:tc>
+                <a:tc>
+                  <a:txBody>
+                    <a:bodyPr/>
+                    <a:lstStyle/>
+                    <a:p>
+                      <a:pPr algn="l"/>
+                      <a:endParaRPr lang="it-IT" dirty="0"/>
+                    </a:p>
+                  </a:txBody>
+                  <a:tcPr/>
+                </a:tc>
+                <a:tc>
+                  <a:txBody>
+                    <a:bodyPr/>
+                    <a:lstStyle/>
+                    <a:p>
+                      <a:pPr algn="l"/>
+                      <a:endParaRPr lang="it-IT" dirty="0"/>
+                    </a:p>
+                  </a:txBody>
+                  <a:tcPr/>
+                </a:tc>
+                <a:tc>
+                  <a:txBody>
+                    <a:bodyPr/>
+                    <a:lstStyle/>
+                    <a:p>
+                      <a:pPr algn="l"/>
+                      <a:endParaRPr lang="it-IT" dirty="0"/>
+                    </a:p>
+                  </a:txBody>
+                  <a:tcPr/>
+                </a:tc>
+                <a:tc>
+                  <a:txBody>
+                    <a:bodyPr/>
+                    <a:lstStyle/>
+                    <a:p>
+                      <a:pPr algn="l"/>
                       <a:endParaRPr lang="it-IT"/>
                     </a:p>
                   </a:txBody>
@@ -22085,6 +22250,128 @@
                     <a:bodyPr/>
                     <a:lstStyle/>
                     <a:p>
+                      <a:pPr algn="l"/>
+                      <a:endParaRPr lang="it-IT" dirty="0"/>
+                    </a:p>
+                  </a:txBody>
+                  <a:tcPr/>
+                </a:tc>
+                <a:tc>
+                  <a:txBody>
+                    <a:bodyPr/>
+                    <a:lstStyle/>
+                    <a:p>
+                      <a:pPr algn="l"/>
+                      <a:r>
+                        <a:rPr lang="it-IT" dirty="0"/>
+                        <a:t>507.842,85</a:t>
+                      </a:r>
+                    </a:p>
+                  </a:txBody>
+                  <a:tcPr/>
+                </a:tc>
+                <a:tc>
+                  <a:txBody>
+                    <a:bodyPr/>
+                    <a:lstStyle/>
+                    <a:p>
+                      <a:pPr algn="l"/>
+                      <a:r>
+                        <a:rPr lang="it-IT" dirty="0"/>
+                        <a:t>112.506,96</a:t>
+                      </a:r>
+                    </a:p>
+                  </a:txBody>
+                  <a:tcPr/>
+                </a:tc>
+                <a:extLst>
+                  <a:ext uri="{0D108BD9-81ED-4DB2-BD59-A6C34878D82A}">
+                    <a16:rowId xmlns:a16="http://schemas.microsoft.com/office/drawing/2014/main" val="1242067950"/>
+                  </a:ext>
+                </a:extLst>
+              </a:tr>
+              <a:tr h="423110">
+                <a:tc>
+                  <a:txBody>
+                    <a:bodyPr/>
+                    <a:lstStyle/>
+                    <a:p>
+                      <a:pPr marL="0" marR="0" lvl="0" indent="0" algn="l" defTabSz="914400" rtl="0" eaLnBrk="1" fontAlgn="auto" latinLnBrk="0" hangingPunct="1">
+                        <a:lnSpc>
+                          <a:spcPct val="100000"/>
+                        </a:lnSpc>
+                        <a:spcBef>
+                          <a:spcPts val="0"/>
+                        </a:spcBef>
+                        <a:spcAft>
+                          <a:spcPts val="0"/>
+                        </a:spcAft>
+                        <a:buClrTx/>
+                        <a:buSzTx/>
+                        <a:buFontTx/>
+                        <a:buNone/>
+                        <a:tabLst/>
+                        <a:defRPr/>
+                      </a:pPr>
+                      <a:r>
+                        <a:rPr lang="it-IT" u="sng"/>
+                        <a:t>Costi</a:t>
+                      </a:r>
+                      <a:endParaRPr lang="it-IT" u="sng" dirty="0"/>
+                    </a:p>
+                  </a:txBody>
+                  <a:tcPr/>
+                </a:tc>
+                <a:tc>
+                  <a:txBody>
+                    <a:bodyPr/>
+                    <a:lstStyle/>
+                    <a:p>
+                      <a:pPr algn="l"/>
+                      <a:endParaRPr lang="it-IT" dirty="0"/>
+                    </a:p>
+                  </a:txBody>
+                  <a:tcPr/>
+                </a:tc>
+                <a:tc>
+                  <a:txBody>
+                    <a:bodyPr/>
+                    <a:lstStyle/>
+                    <a:p>
+                      <a:pPr algn="l"/>
+                      <a:endParaRPr lang="it-IT" dirty="0"/>
+                    </a:p>
+                  </a:txBody>
+                  <a:tcPr/>
+                </a:tc>
+                <a:tc>
+                  <a:txBody>
+                    <a:bodyPr/>
+                    <a:lstStyle/>
+                    <a:p>
+                      <a:pPr algn="l"/>
+                      <a:endParaRPr lang="it-IT" dirty="0"/>
+                    </a:p>
+                  </a:txBody>
+                  <a:tcPr/>
+                </a:tc>
+                <a:tc>
+                  <a:txBody>
+                    <a:bodyPr/>
+                    <a:lstStyle/>
+                    <a:p>
+                      <a:pPr algn="l"/>
+                      <a:endParaRPr lang="it-IT" dirty="0"/>
+                    </a:p>
+                  </a:txBody>
+                  <a:tcPr/>
+                </a:tc>
+                <a:tc>
+                  <a:txBody>
+                    <a:bodyPr/>
+                    <a:lstStyle/>
+                    <a:p>
+                      <a:pPr algn="l"/>
                       <a:endParaRPr lang="it-IT"/>
                     </a:p>
                   </a:txBody>
@@ -22095,6 +22382,7 @@
                     <a:bodyPr/>
                     <a:lstStyle/>
                     <a:p>
+                      <a:pPr algn="l"/>
                       <a:endParaRPr lang="it-IT"/>
                     </a:p>
                   </a:txBody>
@@ -22105,6 +22393,18 @@
                     <a:bodyPr/>
                     <a:lstStyle/>
                     <a:p>
+                      <a:pPr algn="l"/>
+                      <a:endParaRPr lang="it-IT" dirty="0"/>
+                    </a:p>
+                  </a:txBody>
+                  <a:tcPr/>
+                </a:tc>
+                <a:tc>
+                  <a:txBody>
+                    <a:bodyPr/>
+                    <a:lstStyle/>
+                    <a:p>
+                      <a:pPr algn="l"/>
                       <a:endParaRPr lang="it-IT" dirty="0"/>
                     </a:p>
                   </a:txBody>
@@ -22112,7 +22412,257 @@
                 </a:tc>
                 <a:extLst>
                   <a:ext uri="{0D108BD9-81ED-4DB2-BD59-A6C34878D82A}">
-                    <a16:rowId xmlns:a16="http://schemas.microsoft.com/office/drawing/2014/main" val="1242067950"/>
+                    <a16:rowId xmlns:a16="http://schemas.microsoft.com/office/drawing/2014/main" val="3637592334"/>
+                  </a:ext>
+                </a:extLst>
+              </a:tr>
+              <a:tr h="730300">
+                <a:tc>
+                  <a:txBody>
+                    <a:bodyPr/>
+                    <a:lstStyle/>
+                    <a:p>
+                      <a:pPr algn="l"/>
+                      <a:r>
+                        <a:rPr lang="it-IT"/>
+                        <a:t>Materie prime</a:t>
+                      </a:r>
+                      <a:endParaRPr lang="it-IT" dirty="0"/>
+                    </a:p>
+                  </a:txBody>
+                  <a:tcPr/>
+                </a:tc>
+                <a:tc>
+                  <a:txBody>
+                    <a:bodyPr/>
+                    <a:lstStyle/>
+                    <a:p>
+                      <a:pPr algn="l"/>
+                      <a:r>
+                        <a:rPr lang="it-IT" dirty="0"/>
+                        <a:t>192,206,47</a:t>
+                      </a:r>
+                    </a:p>
+                  </a:txBody>
+                  <a:tcPr/>
+                </a:tc>
+                <a:tc>
+                  <a:txBody>
+                    <a:bodyPr/>
+                    <a:lstStyle/>
+                    <a:p>
+                      <a:pPr algn="l"/>
+                      <a:endParaRPr lang="it-IT" dirty="0"/>
+                    </a:p>
+                  </a:txBody>
+                  <a:tcPr/>
+                </a:tc>
+                <a:tc>
+                  <a:txBody>
+                    <a:bodyPr/>
+                    <a:lstStyle/>
+                    <a:p>
+                      <a:pPr algn="l"/>
+                      <a:r>
+                        <a:rPr lang="it-IT" dirty="0"/>
+                        <a:t>192.906,47</a:t>
+                      </a:r>
+                    </a:p>
+                  </a:txBody>
+                  <a:tcPr/>
+                </a:tc>
+                <a:tc>
+                  <a:txBody>
+                    <a:bodyPr/>
+                    <a:lstStyle/>
+                    <a:p>
+                      <a:pPr algn="l"/>
+                      <a:endParaRPr lang="it-IT" dirty="0"/>
+                    </a:p>
+                  </a:txBody>
+                  <a:tcPr/>
+                </a:tc>
+                <a:tc>
+                  <a:txBody>
+                    <a:bodyPr/>
+                    <a:lstStyle/>
+                    <a:p>
+                      <a:pPr algn="l"/>
+                      <a:r>
+                        <a:rPr lang="it-IT" dirty="0"/>
+                        <a:t>273.100,72</a:t>
+                      </a:r>
+                    </a:p>
+                  </a:txBody>
+                  <a:tcPr/>
+                </a:tc>
+                <a:tc>
+                  <a:txBody>
+                    <a:bodyPr/>
+                    <a:lstStyle/>
+                    <a:p>
+                      <a:pPr algn="l"/>
+                      <a:endParaRPr lang="it-IT" dirty="0"/>
+                    </a:p>
+                  </a:txBody>
+                  <a:tcPr/>
+                </a:tc>
+                <a:tc>
+                  <a:txBody>
+                    <a:bodyPr/>
+                    <a:lstStyle/>
+                    <a:p>
+                      <a:pPr algn="l"/>
+                      <a:r>
+                        <a:rPr lang="it-IT" dirty="0"/>
+                        <a:t>289.639,50</a:t>
+                      </a:r>
+                    </a:p>
+                  </a:txBody>
+                  <a:tcPr/>
+                </a:tc>
+                <a:tc>
+                  <a:txBody>
+                    <a:bodyPr/>
+                    <a:lstStyle/>
+                    <a:p>
+                      <a:pPr algn="l"/>
+                      <a:r>
+                        <a:rPr lang="it-IT" dirty="0"/>
+                        <a:t>96.733,03</a:t>
+                      </a:r>
+                    </a:p>
+                  </a:txBody>
+                  <a:tcPr/>
+                </a:tc>
+                <a:extLst>
+                  <a:ext uri="{0D108BD9-81ED-4DB2-BD59-A6C34878D82A}">
+                    <a16:rowId xmlns:a16="http://schemas.microsoft.com/office/drawing/2014/main" val="4251870908"/>
+                  </a:ext>
+                </a:extLst>
+              </a:tr>
+              <a:tr h="730300">
+                <a:tc>
+                  <a:txBody>
+                    <a:bodyPr/>
+                    <a:lstStyle/>
+                    <a:p>
+                      <a:pPr algn="l"/>
+                      <a:r>
+                        <a:rPr lang="it-IT"/>
+                        <a:t>Lavorazioni interne </a:t>
+                      </a:r>
+                      <a:endParaRPr lang="it-IT" dirty="0"/>
+                    </a:p>
+                  </a:txBody>
+                  <a:tcPr/>
+                </a:tc>
+                <a:tc>
+                  <a:txBody>
+                    <a:bodyPr/>
+                    <a:lstStyle/>
+                    <a:p>
+                      <a:pPr algn="l"/>
+                      <a:r>
+                        <a:rPr lang="it-IT" dirty="0"/>
+                        <a:t>194521.50</a:t>
+                      </a:r>
+                    </a:p>
+                  </a:txBody>
+                  <a:tcPr/>
+                </a:tc>
+                <a:tc>
+                  <a:txBody>
+                    <a:bodyPr/>
+                    <a:lstStyle/>
+                    <a:p>
+                      <a:pPr algn="l"/>
+                      <a:endParaRPr lang="it-IT" dirty="0"/>
+                    </a:p>
+                  </a:txBody>
+                  <a:tcPr/>
+                </a:tc>
+                <a:tc>
+                  <a:txBody>
+                    <a:bodyPr/>
+                    <a:lstStyle/>
+                    <a:p>
+                      <a:pPr algn="l"/>
+                      <a:r>
+                        <a:rPr lang="it-IT" dirty="0"/>
+                        <a:t>310.199,34 (?)</a:t>
+                      </a:r>
+                    </a:p>
+                  </a:txBody>
+                  <a:tcPr/>
+                </a:tc>
+                <a:tc>
+                  <a:txBody>
+                    <a:bodyPr/>
+                    <a:lstStyle/>
+                    <a:p>
+                      <a:pPr algn="l"/>
+                      <a:endParaRPr lang="it-IT" dirty="0"/>
+                    </a:p>
+                  </a:txBody>
+                  <a:tcPr/>
+                </a:tc>
+                <a:tc>
+                  <a:txBody>
+                    <a:bodyPr/>
+                    <a:lstStyle/>
+                    <a:p>
+                      <a:pPr algn="l"/>
+                      <a:r>
+                        <a:rPr lang="it-IT" dirty="0"/>
+                        <a:t>281.289,91 (?)</a:t>
+                      </a:r>
+                    </a:p>
+                  </a:txBody>
+                  <a:tcPr/>
+                </a:tc>
+                <a:tc>
+                  <a:txBody>
+                    <a:bodyPr/>
+                    <a:lstStyle/>
+                    <a:p>
+                      <a:pPr algn="l"/>
+                      <a:endParaRPr lang="it-IT" dirty="0"/>
+                    </a:p>
+                  </a:txBody>
+                  <a:tcPr/>
+                </a:tc>
+                <a:tc>
+                  <a:txBody>
+                    <a:bodyPr/>
+                    <a:lstStyle/>
+                    <a:p>
+                      <a:pPr algn="l"/>
+                      <a:r>
+                        <a:rPr lang="it-IT" dirty="0"/>
+                        <a:t>359238.30</a:t>
+                      </a:r>
+                    </a:p>
+                  </a:txBody>
+                  <a:tcPr/>
+                </a:tc>
+                <a:tc>
+                  <a:txBody>
+                    <a:bodyPr/>
+                    <a:lstStyle/>
+                    <a:p>
+                      <a:pPr algn="l"/>
+                      <a:r>
+                        <a:rPr lang="it-IT" dirty="0"/>
+                        <a:t>164.716,79</a:t>
+                      </a:r>
+                    </a:p>
+                  </a:txBody>
+                  <a:tcPr/>
+                </a:tc>
+                <a:extLst>
+                  <a:ext uri="{0D108BD9-81ED-4DB2-BD59-A6C34878D82A}">
+                    <a16:rowId xmlns:a16="http://schemas.microsoft.com/office/drawing/2014/main" val="1378050463"/>
                   </a:ext>
                 </a:extLst>
               </a:tr>
@@ -22124,90 +22674,6 @@
     <p:extLst>
       <p:ext uri="{BB962C8B-B14F-4D97-AF65-F5344CB8AC3E}">
         <p14:creationId xmlns:p14="http://schemas.microsoft.com/office/powerpoint/2010/main" val="2234865979"/>
-      </p:ext>
-    </p:extLst>
-  </p:cSld>
-  <p:clrMapOvr>
-    <a:masterClrMapping/>
-  </p:clrMapOvr>
-</p:sld>
-</file>
-
-<file path=ppt/slides/slide7.xml><?xml version="1.0" encoding="utf-8"?>
-<p:sld xmlns:a="http://schemas.openxmlformats.org/drawingml/2006/main" xmlns:r="http://schemas.openxmlformats.org/officeDocument/2006/relationships" xmlns:p="http://schemas.openxmlformats.org/presentationml/2006/main">
-  <p:cSld>
-    <p:spTree>
-      <p:nvGrpSpPr>
-        <p:cNvPr id="1" name=""/>
-        <p:cNvGrpSpPr/>
-        <p:nvPr/>
-      </p:nvGrpSpPr>
-      <p:grpSpPr>
-        <a:xfrm>
-          <a:off x="0" y="0"/>
-          <a:ext cx="0" cy="0"/>
-          <a:chOff x="0" y="0"/>
-          <a:chExt cx="0" cy="0"/>
-        </a:xfrm>
-      </p:grpSpPr>
-      <p:sp>
-        <p:nvSpPr>
-          <p:cNvPr id="2" name="Titolo 1">
-            <a:extLst>
-              <a:ext uri="{FF2B5EF4-FFF2-40B4-BE49-F238E27FC236}">
-                <a16:creationId xmlns:a16="http://schemas.microsoft.com/office/drawing/2014/main" id="{52DD8312-69FC-4D49-BFF9-B46ED17BB864}"/>
-              </a:ext>
-            </a:extLst>
-          </p:cNvPr>
-          <p:cNvSpPr>
-            <a:spLocks noGrp="1"/>
-          </p:cNvSpPr>
-          <p:nvPr>
-            <p:ph type="title"/>
-          </p:nvPr>
-        </p:nvSpPr>
-        <p:spPr/>
-        <p:txBody>
-          <a:bodyPr/>
-          <a:lstStyle/>
-          <a:p>
-            <a:r>
-              <a:rPr lang="it-IT" dirty="0" err="1"/>
-              <a:t>RIsultati</a:t>
-            </a:r>
-            <a:endParaRPr lang="it-IT" dirty="0"/>
-          </a:p>
-        </p:txBody>
-      </p:sp>
-      <p:sp>
-        <p:nvSpPr>
-          <p:cNvPr id="3" name="Segnaposto contenuto 2">
-            <a:extLst>
-              <a:ext uri="{FF2B5EF4-FFF2-40B4-BE49-F238E27FC236}">
-                <a16:creationId xmlns:a16="http://schemas.microsoft.com/office/drawing/2014/main" id="{6AA589C1-061A-704C-AFD2-A039E382B9DC}"/>
-              </a:ext>
-            </a:extLst>
-          </p:cNvPr>
-          <p:cNvSpPr>
-            <a:spLocks noGrp="1"/>
-          </p:cNvSpPr>
-          <p:nvPr>
-            <p:ph idx="1"/>
-          </p:nvPr>
-        </p:nvSpPr>
-        <p:spPr/>
-        <p:txBody>
-          <a:bodyPr/>
-          <a:lstStyle/>
-          <a:p>
-            <a:endParaRPr lang="it-IT"/>
-          </a:p>
-        </p:txBody>
-      </p:sp>
-    </p:spTree>
-    <p:extLst>
-      <p:ext uri="{BB962C8B-B14F-4D97-AF65-F5344CB8AC3E}">
-        <p14:creationId xmlns:p14="http://schemas.microsoft.com/office/powerpoint/2010/main" val="2983763974"/>
       </p:ext>
     </p:extLst>
   </p:cSld>

</xml_diff>

<commit_message>
BUON ANNO SI VOLAAAAAA
</commit_message>
<xml_diff>
--- a/Document/PresentazioneProgetto.pptx
+++ b/Document/PresentazioneProgetto.pptx
@@ -12,9 +12,10 @@
     <p:sldId id="260" r:id="rId6"/>
     <p:sldId id="264" r:id="rId7"/>
     <p:sldId id="265" r:id="rId8"/>
-    <p:sldId id="266" r:id="rId9"/>
-    <p:sldId id="262" r:id="rId10"/>
-    <p:sldId id="263" r:id="rId11"/>
+    <p:sldId id="267" r:id="rId9"/>
+    <p:sldId id="266" r:id="rId10"/>
+    <p:sldId id="262" r:id="rId11"/>
+    <p:sldId id="263" r:id="rId12"/>
   </p:sldIdLst>
   <p:sldSz cx="12192000" cy="6858000"/>
   <p:notesSz cx="6858000" cy="9144000"/>
@@ -20852,6 +20853,933 @@
           <p:cNvPr id="2" name="Titolo 1">
             <a:extLst>
               <a:ext uri="{FF2B5EF4-FFF2-40B4-BE49-F238E27FC236}">
+                <a16:creationId xmlns:a16="http://schemas.microsoft.com/office/drawing/2014/main" id="{E73A98B8-1F47-2447-8BE2-E9DF0B1A16D0}"/>
+              </a:ext>
+            </a:extLst>
+          </p:cNvPr>
+          <p:cNvSpPr>
+            <a:spLocks noGrp="1"/>
+          </p:cNvSpPr>
+          <p:nvPr>
+            <p:ph type="title"/>
+          </p:nvPr>
+        </p:nvSpPr>
+        <p:spPr/>
+        <p:txBody>
+          <a:bodyPr/>
+          <a:lstStyle/>
+          <a:p>
+            <a:r>
+              <a:rPr lang="it-IT"/>
+              <a:t>Esecuzione degli scostamenti</a:t>
+            </a:r>
+          </a:p>
+        </p:txBody>
+      </p:sp>
+      <p:graphicFrame>
+        <p:nvGraphicFramePr>
+          <p:cNvPr id="4" name="Tabella 4">
+            <a:extLst>
+              <a:ext uri="{FF2B5EF4-FFF2-40B4-BE49-F238E27FC236}">
+                <a16:creationId xmlns:a16="http://schemas.microsoft.com/office/drawing/2014/main" id="{CB59760C-95C5-0B4C-AD26-423EC055CB2F}"/>
+              </a:ext>
+            </a:extLst>
+          </p:cNvPr>
+          <p:cNvGraphicFramePr>
+            <a:graphicFrameLocks noGrp="1"/>
+          </p:cNvGraphicFramePr>
+          <p:nvPr>
+            <p:ph idx="1"/>
+            <p:extLst>
+              <p:ext uri="{D42A27DB-BD31-4B8C-83A1-F6EECF244321}">
+                <p14:modId xmlns:p14="http://schemas.microsoft.com/office/powerpoint/2010/main" val="628559778"/>
+              </p:ext>
+            </p:extLst>
+          </p:nvPr>
+        </p:nvGraphicFramePr>
+        <p:xfrm>
+          <a:off x="95714" y="1555654"/>
+          <a:ext cx="12000571" cy="4717130"/>
+        </p:xfrm>
+        <a:graphic>
+          <a:graphicData uri="http://schemas.openxmlformats.org/drawingml/2006/table">
+            <a:tbl>
+              <a:tblPr firstRow="1" bandRow="1">
+                <a:tableStyleId>{5C22544A-7EE6-4342-B048-85BDC9FD1C3A}</a:tableStyleId>
+              </a:tblPr>
+              <a:tblGrid>
+                <a:gridCol w="1333397">
+                  <a:extLst>
+                    <a:ext uri="{9D8B030D-6E8A-4147-A177-3AD203B41FA5}">
+                      <a16:colId xmlns:a16="http://schemas.microsoft.com/office/drawing/2014/main" val="3039533413"/>
+                    </a:ext>
+                  </a:extLst>
+                </a:gridCol>
+                <a:gridCol w="1386281">
+                  <a:extLst>
+                    <a:ext uri="{9D8B030D-6E8A-4147-A177-3AD203B41FA5}">
+                      <a16:colId xmlns:a16="http://schemas.microsoft.com/office/drawing/2014/main" val="1628745461"/>
+                    </a:ext>
+                  </a:extLst>
+                </a:gridCol>
+                <a:gridCol w="1280511">
+                  <a:extLst>
+                    <a:ext uri="{9D8B030D-6E8A-4147-A177-3AD203B41FA5}">
+                      <a16:colId xmlns:a16="http://schemas.microsoft.com/office/drawing/2014/main" val="3012836848"/>
+                    </a:ext>
+                  </a:extLst>
+                </a:gridCol>
+                <a:gridCol w="1337176">
+                  <a:extLst>
+                    <a:ext uri="{9D8B030D-6E8A-4147-A177-3AD203B41FA5}">
+                      <a16:colId xmlns:a16="http://schemas.microsoft.com/office/drawing/2014/main" val="3335112797"/>
+                    </a:ext>
+                  </a:extLst>
+                </a:gridCol>
+                <a:gridCol w="1329618">
+                  <a:extLst>
+                    <a:ext uri="{9D8B030D-6E8A-4147-A177-3AD203B41FA5}">
+                      <a16:colId xmlns:a16="http://schemas.microsoft.com/office/drawing/2014/main" val="3262263587"/>
+                    </a:ext>
+                  </a:extLst>
+                </a:gridCol>
+                <a:gridCol w="1390059">
+                  <a:extLst>
+                    <a:ext uri="{9D8B030D-6E8A-4147-A177-3AD203B41FA5}">
+                      <a16:colId xmlns:a16="http://schemas.microsoft.com/office/drawing/2014/main" val="3015288968"/>
+                    </a:ext>
+                  </a:extLst>
+                </a:gridCol>
+                <a:gridCol w="1337174">
+                  <a:extLst>
+                    <a:ext uri="{9D8B030D-6E8A-4147-A177-3AD203B41FA5}">
+                      <a16:colId xmlns:a16="http://schemas.microsoft.com/office/drawing/2014/main" val="3807841347"/>
+                    </a:ext>
+                  </a:extLst>
+                </a:gridCol>
+                <a:gridCol w="1272958">
+                  <a:extLst>
+                    <a:ext uri="{9D8B030D-6E8A-4147-A177-3AD203B41FA5}">
+                      <a16:colId xmlns:a16="http://schemas.microsoft.com/office/drawing/2014/main" val="3378513636"/>
+                    </a:ext>
+                  </a:extLst>
+                </a:gridCol>
+                <a:gridCol w="1333397">
+                  <a:extLst>
+                    <a:ext uri="{9D8B030D-6E8A-4147-A177-3AD203B41FA5}">
+                      <a16:colId xmlns:a16="http://schemas.microsoft.com/office/drawing/2014/main" val="1681983959"/>
+                    </a:ext>
+                  </a:extLst>
+                </a:gridCol>
+              </a:tblGrid>
+              <a:tr h="1149022">
+                <a:tc>
+                  <a:txBody>
+                    <a:bodyPr/>
+                    <a:lstStyle/>
+                    <a:p>
+                      <a:pPr algn="l"/>
+                      <a:endParaRPr lang="it-IT" dirty="0"/>
+                    </a:p>
+                  </a:txBody>
+                  <a:tcPr/>
+                </a:tc>
+                <a:tc>
+                  <a:txBody>
+                    <a:bodyPr/>
+                    <a:lstStyle/>
+                    <a:p>
+                      <a:pPr algn="l"/>
+                      <a:r>
+                        <a:rPr lang="it-IT" dirty="0"/>
+                        <a:t>Budget</a:t>
+                      </a:r>
+                    </a:p>
+                  </a:txBody>
+                  <a:tcPr/>
+                </a:tc>
+                <a:tc>
+                  <a:txBody>
+                    <a:bodyPr/>
+                    <a:lstStyle/>
+                    <a:p>
+                      <a:pPr algn="l"/>
+                      <a:r>
+                        <a:rPr lang="it-IT" dirty="0"/>
+                        <a:t>Scostamento di volume</a:t>
+                      </a:r>
+                    </a:p>
+                  </a:txBody>
+                  <a:tcPr/>
+                </a:tc>
+                <a:tc>
+                  <a:txBody>
+                    <a:bodyPr/>
+                    <a:lstStyle/>
+                    <a:p>
+                      <a:pPr algn="l"/>
+                      <a:r>
+                        <a:rPr lang="it-IT" dirty="0"/>
+                        <a:t>Standard</a:t>
+                      </a:r>
+                    </a:p>
+                  </a:txBody>
+                  <a:tcPr/>
+                </a:tc>
+                <a:tc>
+                  <a:txBody>
+                    <a:bodyPr/>
+                    <a:lstStyle/>
+                    <a:p>
+                      <a:pPr algn="l"/>
+                      <a:r>
+                        <a:rPr lang="it-IT" dirty="0"/>
+                        <a:t>Scostamento di impiego/MIX</a:t>
+                      </a:r>
+                    </a:p>
+                  </a:txBody>
+                  <a:tcPr/>
+                </a:tc>
+                <a:tc>
+                  <a:txBody>
+                    <a:bodyPr/>
+                    <a:lstStyle/>
+                    <a:p>
+                      <a:pPr algn="l"/>
+                      <a:r>
+                        <a:rPr lang="it-IT" dirty="0"/>
+                        <a:t>Effettivo</a:t>
+                      </a:r>
+                    </a:p>
+                  </a:txBody>
+                  <a:tcPr/>
+                </a:tc>
+                <a:tc>
+                  <a:txBody>
+                    <a:bodyPr/>
+                    <a:lstStyle/>
+                    <a:p>
+                      <a:pPr algn="l"/>
+                      <a:r>
+                        <a:rPr lang="it-IT" dirty="0"/>
+                        <a:t>Scostamento di prezzo</a:t>
+                      </a:r>
+                    </a:p>
+                  </a:txBody>
+                  <a:tcPr/>
+                </a:tc>
+                <a:tc>
+                  <a:txBody>
+                    <a:bodyPr/>
+                    <a:lstStyle/>
+                    <a:p>
+                      <a:pPr algn="l"/>
+                      <a:r>
+                        <a:rPr lang="it-IT" dirty="0"/>
+                        <a:t>Consuntivo</a:t>
+                      </a:r>
+                    </a:p>
+                  </a:txBody>
+                  <a:tcPr/>
+                </a:tc>
+                <a:tc>
+                  <a:txBody>
+                    <a:bodyPr/>
+                    <a:lstStyle/>
+                    <a:p>
+                      <a:pPr algn="l"/>
+                      <a:r>
+                        <a:rPr lang="it-IT"/>
+                        <a:t>Scostamento consuntivo- budget</a:t>
+                      </a:r>
+                      <a:endParaRPr lang="it-IT" dirty="0"/>
+                    </a:p>
+                  </a:txBody>
+                  <a:tcPr/>
+                </a:tc>
+                <a:extLst>
+                  <a:ext uri="{0D108BD9-81ED-4DB2-BD59-A6C34878D82A}">
+                    <a16:rowId xmlns:a16="http://schemas.microsoft.com/office/drawing/2014/main" val="3282615153"/>
+                  </a:ext>
+                </a:extLst>
+              </a:tr>
+              <a:tr h="730300">
+                <a:tc>
+                  <a:txBody>
+                    <a:bodyPr/>
+                    <a:lstStyle/>
+                    <a:p>
+                      <a:pPr algn="l"/>
+                      <a:r>
+                        <a:rPr lang="it-IT"/>
+                        <a:t>Vendite</a:t>
+                      </a:r>
+                      <a:endParaRPr lang="it-IT" dirty="0"/>
+                    </a:p>
+                  </a:txBody>
+                  <a:tcPr/>
+                </a:tc>
+                <a:tc>
+                  <a:txBody>
+                    <a:bodyPr/>
+                    <a:lstStyle/>
+                    <a:p>
+                      <a:pPr algn="l"/>
+                      <a:r>
+                        <a:rPr lang="it-IT" dirty="0"/>
+                        <a:t>395.335,89</a:t>
+                      </a:r>
+                    </a:p>
+                  </a:txBody>
+                  <a:tcPr/>
+                </a:tc>
+                <a:tc>
+                  <a:txBody>
+                    <a:bodyPr/>
+                    <a:lstStyle/>
+                    <a:p>
+                      <a:pPr algn="l"/>
+                      <a:r>
+                        <a:rPr lang="it-IT" dirty="0"/>
+                        <a:t>115.196,85</a:t>
+                      </a:r>
+                    </a:p>
+                  </a:txBody>
+                  <a:tcPr/>
+                </a:tc>
+                <a:tc>
+                  <a:txBody>
+                    <a:bodyPr/>
+                    <a:lstStyle/>
+                    <a:p>
+                      <a:pPr algn="l"/>
+                      <a:r>
+                        <a:rPr lang="it-IT" dirty="0"/>
+                        <a:t>510.532, 74</a:t>
+                      </a:r>
+                    </a:p>
+                  </a:txBody>
+                  <a:tcPr/>
+                </a:tc>
+                <a:tc>
+                  <a:txBody>
+                    <a:bodyPr/>
+                    <a:lstStyle/>
+                    <a:p>
+                      <a:pPr algn="l"/>
+                      <a:r>
+                        <a:rPr lang="it-IT" dirty="0"/>
+                        <a:t>28.579,68</a:t>
+                      </a:r>
+                    </a:p>
+                  </a:txBody>
+                  <a:tcPr/>
+                </a:tc>
+                <a:tc>
+                  <a:txBody>
+                    <a:bodyPr/>
+                    <a:lstStyle/>
+                    <a:p>
+                      <a:pPr algn="l"/>
+                      <a:r>
+                        <a:rPr lang="it-IT" dirty="0"/>
+                        <a:t>539.112,42</a:t>
+                      </a:r>
+                    </a:p>
+                  </a:txBody>
+                  <a:tcPr/>
+                </a:tc>
+                <a:tc>
+                  <a:txBody>
+                    <a:bodyPr/>
+                    <a:lstStyle/>
+                    <a:p>
+                      <a:pPr algn="l"/>
+                      <a:r>
+                        <a:rPr lang="it-IT" dirty="0"/>
+                        <a:t>-31.269,58</a:t>
+                      </a:r>
+                    </a:p>
+                  </a:txBody>
+                  <a:tcPr/>
+                </a:tc>
+                <a:tc>
+                  <a:txBody>
+                    <a:bodyPr/>
+                    <a:lstStyle/>
+                    <a:p>
+                      <a:pPr algn="l"/>
+                      <a:r>
+                        <a:rPr lang="it-IT" dirty="0"/>
+                        <a:t>507.842,85</a:t>
+                      </a:r>
+                    </a:p>
+                  </a:txBody>
+                  <a:tcPr/>
+                </a:tc>
+                <a:tc>
+                  <a:txBody>
+                    <a:bodyPr/>
+                    <a:lstStyle/>
+                    <a:p>
+                      <a:pPr algn="l"/>
+                      <a:r>
+                        <a:rPr lang="it-IT" dirty="0"/>
+                        <a:t>112.506,96</a:t>
+                      </a:r>
+                    </a:p>
+                  </a:txBody>
+                  <a:tcPr/>
+                </a:tc>
+                <a:extLst>
+                  <a:ext uri="{0D108BD9-81ED-4DB2-BD59-A6C34878D82A}">
+                    <a16:rowId xmlns:a16="http://schemas.microsoft.com/office/drawing/2014/main" val="1242067950"/>
+                  </a:ext>
+                </a:extLst>
+              </a:tr>
+              <a:tr h="423110">
+                <a:tc>
+                  <a:txBody>
+                    <a:bodyPr/>
+                    <a:lstStyle/>
+                    <a:p>
+                      <a:pPr marL="0" marR="0" lvl="0" indent="0" algn="l" defTabSz="914400" rtl="0" eaLnBrk="1" fontAlgn="auto" latinLnBrk="0" hangingPunct="1">
+                        <a:lnSpc>
+                          <a:spcPct val="100000"/>
+                        </a:lnSpc>
+                        <a:spcBef>
+                          <a:spcPts val="0"/>
+                        </a:spcBef>
+                        <a:spcAft>
+                          <a:spcPts val="0"/>
+                        </a:spcAft>
+                        <a:buClrTx/>
+                        <a:buSzTx/>
+                        <a:buFontTx/>
+                        <a:buNone/>
+                        <a:tabLst/>
+                        <a:defRPr/>
+                      </a:pPr>
+                      <a:r>
+                        <a:rPr lang="it-IT" u="sng"/>
+                        <a:t>Costi</a:t>
+                      </a:r>
+                      <a:endParaRPr lang="it-IT" u="sng" dirty="0"/>
+                    </a:p>
+                  </a:txBody>
+                  <a:tcPr/>
+                </a:tc>
+                <a:tc>
+                  <a:txBody>
+                    <a:bodyPr/>
+                    <a:lstStyle/>
+                    <a:p>
+                      <a:pPr algn="l"/>
+                      <a:endParaRPr lang="it-IT" dirty="0"/>
+                    </a:p>
+                  </a:txBody>
+                  <a:tcPr/>
+                </a:tc>
+                <a:tc>
+                  <a:txBody>
+                    <a:bodyPr/>
+                    <a:lstStyle/>
+                    <a:p>
+                      <a:pPr algn="l"/>
+                      <a:endParaRPr lang="it-IT" dirty="0"/>
+                    </a:p>
+                  </a:txBody>
+                  <a:tcPr/>
+                </a:tc>
+                <a:tc>
+                  <a:txBody>
+                    <a:bodyPr/>
+                    <a:lstStyle/>
+                    <a:p>
+                      <a:pPr algn="l"/>
+                      <a:endParaRPr lang="it-IT" dirty="0"/>
+                    </a:p>
+                  </a:txBody>
+                  <a:tcPr/>
+                </a:tc>
+                <a:tc>
+                  <a:txBody>
+                    <a:bodyPr/>
+                    <a:lstStyle/>
+                    <a:p>
+                      <a:pPr algn="l"/>
+                      <a:endParaRPr lang="it-IT" dirty="0"/>
+                    </a:p>
+                  </a:txBody>
+                  <a:tcPr/>
+                </a:tc>
+                <a:tc>
+                  <a:txBody>
+                    <a:bodyPr/>
+                    <a:lstStyle/>
+                    <a:p>
+                      <a:pPr algn="l"/>
+                      <a:endParaRPr lang="it-IT"/>
+                    </a:p>
+                  </a:txBody>
+                  <a:tcPr/>
+                </a:tc>
+                <a:tc>
+                  <a:txBody>
+                    <a:bodyPr/>
+                    <a:lstStyle/>
+                    <a:p>
+                      <a:pPr algn="l"/>
+                      <a:endParaRPr lang="it-IT"/>
+                    </a:p>
+                  </a:txBody>
+                  <a:tcPr/>
+                </a:tc>
+                <a:tc>
+                  <a:txBody>
+                    <a:bodyPr/>
+                    <a:lstStyle/>
+                    <a:p>
+                      <a:pPr algn="l"/>
+                      <a:endParaRPr lang="it-IT" dirty="0"/>
+                    </a:p>
+                  </a:txBody>
+                  <a:tcPr/>
+                </a:tc>
+                <a:tc>
+                  <a:txBody>
+                    <a:bodyPr/>
+                    <a:lstStyle/>
+                    <a:p>
+                      <a:pPr algn="l"/>
+                      <a:endParaRPr lang="it-IT" dirty="0"/>
+                    </a:p>
+                  </a:txBody>
+                  <a:tcPr/>
+                </a:tc>
+                <a:extLst>
+                  <a:ext uri="{0D108BD9-81ED-4DB2-BD59-A6C34878D82A}">
+                    <a16:rowId xmlns:a16="http://schemas.microsoft.com/office/drawing/2014/main" val="3637592334"/>
+                  </a:ext>
+                </a:extLst>
+              </a:tr>
+              <a:tr h="730300">
+                <a:tc>
+                  <a:txBody>
+                    <a:bodyPr/>
+                    <a:lstStyle/>
+                    <a:p>
+                      <a:pPr algn="l"/>
+                      <a:r>
+                        <a:rPr lang="it-IT"/>
+                        <a:t>Materie prime</a:t>
+                      </a:r>
+                      <a:endParaRPr lang="it-IT" dirty="0"/>
+                    </a:p>
+                  </a:txBody>
+                  <a:tcPr/>
+                </a:tc>
+                <a:tc>
+                  <a:txBody>
+                    <a:bodyPr/>
+                    <a:lstStyle/>
+                    <a:p>
+                      <a:pPr algn="l"/>
+                      <a:r>
+                        <a:rPr lang="it-IT" dirty="0"/>
+                        <a:t>192.206,47</a:t>
+                      </a:r>
+                    </a:p>
+                  </a:txBody>
+                  <a:tcPr/>
+                </a:tc>
+                <a:tc>
+                  <a:txBody>
+                    <a:bodyPr/>
+                    <a:lstStyle/>
+                    <a:p>
+                      <a:pPr algn="l"/>
+                      <a:r>
+                        <a:rPr lang="it-IT" dirty="0"/>
+                        <a:t>700</a:t>
+                      </a:r>
+                    </a:p>
+                  </a:txBody>
+                  <a:tcPr/>
+                </a:tc>
+                <a:tc>
+                  <a:txBody>
+                    <a:bodyPr/>
+                    <a:lstStyle/>
+                    <a:p>
+                      <a:pPr algn="l"/>
+                      <a:r>
+                        <a:rPr lang="it-IT" dirty="0"/>
+                        <a:t>192.906,47</a:t>
+                      </a:r>
+                    </a:p>
+                  </a:txBody>
+                  <a:tcPr/>
+                </a:tc>
+                <a:tc>
+                  <a:txBody>
+                    <a:bodyPr/>
+                    <a:lstStyle/>
+                    <a:p>
+                      <a:pPr algn="l"/>
+                      <a:r>
+                        <a:rPr lang="it-IT" dirty="0"/>
+                        <a:t>80.194,25</a:t>
+                      </a:r>
+                    </a:p>
+                  </a:txBody>
+                  <a:tcPr/>
+                </a:tc>
+                <a:tc>
+                  <a:txBody>
+                    <a:bodyPr/>
+                    <a:lstStyle/>
+                    <a:p>
+                      <a:pPr algn="l"/>
+                      <a:r>
+                        <a:rPr lang="it-IT" dirty="0"/>
+                        <a:t>273.100,72</a:t>
+                      </a:r>
+                    </a:p>
+                  </a:txBody>
+                  <a:tcPr/>
+                </a:tc>
+                <a:tc>
+                  <a:txBody>
+                    <a:bodyPr/>
+                    <a:lstStyle/>
+                    <a:p>
+                      <a:pPr algn="l"/>
+                      <a:r>
+                        <a:rPr lang="it-IT"/>
+                        <a:t> </a:t>
+                      </a:r>
+                      <a:endParaRPr lang="it-IT" dirty="0"/>
+                    </a:p>
+                  </a:txBody>
+                  <a:tcPr/>
+                </a:tc>
+                <a:tc>
+                  <a:txBody>
+                    <a:bodyPr/>
+                    <a:lstStyle/>
+                    <a:p>
+                      <a:pPr algn="l"/>
+                      <a:r>
+                        <a:rPr lang="it-IT" dirty="0"/>
+                        <a:t>289.639,50</a:t>
+                      </a:r>
+                    </a:p>
+                  </a:txBody>
+                  <a:tcPr/>
+                </a:tc>
+                <a:tc>
+                  <a:txBody>
+                    <a:bodyPr/>
+                    <a:lstStyle/>
+                    <a:p>
+                      <a:pPr algn="l"/>
+                      <a:r>
+                        <a:rPr lang="it-IT" dirty="0"/>
+                        <a:t>96.733,03</a:t>
+                      </a:r>
+                    </a:p>
+                  </a:txBody>
+                  <a:tcPr/>
+                </a:tc>
+                <a:extLst>
+                  <a:ext uri="{0D108BD9-81ED-4DB2-BD59-A6C34878D82A}">
+                    <a16:rowId xmlns:a16="http://schemas.microsoft.com/office/drawing/2014/main" val="4251870908"/>
+                  </a:ext>
+                </a:extLst>
+              </a:tr>
+              <a:tr h="730300">
+                <a:tc>
+                  <a:txBody>
+                    <a:bodyPr/>
+                    <a:lstStyle/>
+                    <a:p>
+                      <a:pPr algn="l"/>
+                      <a:r>
+                        <a:rPr lang="it-IT" dirty="0"/>
+                        <a:t>Lavorazioni interne </a:t>
+                      </a:r>
+                    </a:p>
+                  </a:txBody>
+                  <a:tcPr/>
+                </a:tc>
+                <a:tc>
+                  <a:txBody>
+                    <a:bodyPr/>
+                    <a:lstStyle/>
+                    <a:p>
+                      <a:pPr algn="l"/>
+                      <a:r>
+                        <a:rPr lang="it-IT" dirty="0"/>
+                        <a:t>194.521,50</a:t>
+                      </a:r>
+                    </a:p>
+                  </a:txBody>
+                  <a:tcPr/>
+                </a:tc>
+                <a:tc>
+                  <a:txBody>
+                    <a:bodyPr/>
+                    <a:lstStyle/>
+                    <a:p>
+                      <a:pPr algn="l"/>
+                      <a:endParaRPr lang="it-IT" dirty="0"/>
+                    </a:p>
+                  </a:txBody>
+                  <a:tcPr/>
+                </a:tc>
+                <a:tc>
+                  <a:txBody>
+                    <a:bodyPr/>
+                    <a:lstStyle/>
+                    <a:p>
+                      <a:pPr algn="l"/>
+                      <a:r>
+                        <a:rPr lang="it-IT" dirty="0"/>
+                        <a:t>310.199,34 (?)</a:t>
+                      </a:r>
+                    </a:p>
+                  </a:txBody>
+                  <a:tcPr/>
+                </a:tc>
+                <a:tc>
+                  <a:txBody>
+                    <a:bodyPr/>
+                    <a:lstStyle/>
+                    <a:p>
+                      <a:pPr algn="l"/>
+                      <a:endParaRPr lang="it-IT" dirty="0"/>
+                    </a:p>
+                  </a:txBody>
+                  <a:tcPr/>
+                </a:tc>
+                <a:tc>
+                  <a:txBody>
+                    <a:bodyPr/>
+                    <a:lstStyle/>
+                    <a:p>
+                      <a:pPr algn="l"/>
+                      <a:r>
+                        <a:rPr lang="it-IT" dirty="0"/>
+                        <a:t>281.289,91 (?)</a:t>
+                      </a:r>
+                    </a:p>
+                  </a:txBody>
+                  <a:tcPr/>
+                </a:tc>
+                <a:tc>
+                  <a:txBody>
+                    <a:bodyPr/>
+                    <a:lstStyle/>
+                    <a:p>
+                      <a:pPr algn="l"/>
+                      <a:endParaRPr lang="it-IT" dirty="0"/>
+                    </a:p>
+                  </a:txBody>
+                  <a:tcPr/>
+                </a:tc>
+                <a:tc>
+                  <a:txBody>
+                    <a:bodyPr/>
+                    <a:lstStyle/>
+                    <a:p>
+                      <a:pPr algn="l"/>
+                      <a:r>
+                        <a:rPr lang="it-IT"/>
+                        <a:t>359.238,30</a:t>
+                      </a:r>
+                      <a:endParaRPr lang="it-IT" dirty="0"/>
+                    </a:p>
+                  </a:txBody>
+                  <a:tcPr/>
+                </a:tc>
+                <a:tc>
+                  <a:txBody>
+                    <a:bodyPr/>
+                    <a:lstStyle/>
+                    <a:p>
+                      <a:pPr algn="l"/>
+                      <a:r>
+                        <a:rPr lang="it-IT" dirty="0"/>
+                        <a:t>164.716,79</a:t>
+                      </a:r>
+                    </a:p>
+                  </a:txBody>
+                  <a:tcPr/>
+                </a:tc>
+                <a:extLst>
+                  <a:ext uri="{0D108BD9-81ED-4DB2-BD59-A6C34878D82A}">
+                    <a16:rowId xmlns:a16="http://schemas.microsoft.com/office/drawing/2014/main" val="1378050463"/>
+                  </a:ext>
+                </a:extLst>
+              </a:tr>
+              <a:tr h="730300">
+                <a:tc>
+                  <a:txBody>
+                    <a:bodyPr/>
+                    <a:lstStyle/>
+                    <a:p>
+                      <a:pPr algn="l"/>
+                      <a:r>
+                        <a:rPr lang="it-IT" dirty="0"/>
+                        <a:t>MOL </a:t>
+                      </a:r>
+                    </a:p>
+                  </a:txBody>
+                  <a:tcPr/>
+                </a:tc>
+                <a:tc>
+                  <a:txBody>
+                    <a:bodyPr/>
+                    <a:lstStyle/>
+                    <a:p>
+                      <a:pPr algn="l"/>
+                      <a:r>
+                        <a:rPr lang="it-IT" dirty="0"/>
+                        <a:t>7.907,92</a:t>
+                      </a:r>
+                    </a:p>
+                  </a:txBody>
+                  <a:tcPr/>
+                </a:tc>
+                <a:tc>
+                  <a:txBody>
+                    <a:bodyPr/>
+                    <a:lstStyle/>
+                    <a:p>
+                      <a:pPr algn="l"/>
+                      <a:endParaRPr lang="it-IT" dirty="0"/>
+                    </a:p>
+                  </a:txBody>
+                  <a:tcPr/>
+                </a:tc>
+                <a:tc>
+                  <a:txBody>
+                    <a:bodyPr/>
+                    <a:lstStyle/>
+                    <a:p>
+                      <a:pPr algn="l"/>
+                      <a:endParaRPr lang="it-IT" dirty="0"/>
+                    </a:p>
+                  </a:txBody>
+                  <a:tcPr/>
+                </a:tc>
+                <a:tc>
+                  <a:txBody>
+                    <a:bodyPr/>
+                    <a:lstStyle/>
+                    <a:p>
+                      <a:pPr algn="l"/>
+                      <a:endParaRPr lang="it-IT" dirty="0"/>
+                    </a:p>
+                  </a:txBody>
+                  <a:tcPr/>
+                </a:tc>
+                <a:tc>
+                  <a:txBody>
+                    <a:bodyPr/>
+                    <a:lstStyle/>
+                    <a:p>
+                      <a:pPr algn="l"/>
+                      <a:endParaRPr lang="it-IT" dirty="0"/>
+                    </a:p>
+                  </a:txBody>
+                  <a:tcPr/>
+                </a:tc>
+                <a:tc>
+                  <a:txBody>
+                    <a:bodyPr/>
+                    <a:lstStyle/>
+                    <a:p>
+                      <a:pPr algn="l"/>
+                      <a:endParaRPr lang="it-IT" dirty="0"/>
+                    </a:p>
+                  </a:txBody>
+                  <a:tcPr/>
+                </a:tc>
+                <a:tc>
+                  <a:txBody>
+                    <a:bodyPr/>
+                    <a:lstStyle/>
+                    <a:p>
+                      <a:pPr algn="l"/>
+                      <a:r>
+                        <a:rPr lang="it-IT" dirty="0"/>
+                        <a:t>-141.012,55</a:t>
+                      </a:r>
+                    </a:p>
+                  </a:txBody>
+                  <a:tcPr/>
+                </a:tc>
+                <a:tc>
+                  <a:txBody>
+                    <a:bodyPr/>
+                    <a:lstStyle/>
+                    <a:p>
+                      <a:pPr algn="l"/>
+                      <a:r>
+                        <a:rPr lang="it-IT" dirty="0"/>
+                        <a:t>-148.920,36</a:t>
+                      </a:r>
+                    </a:p>
+                  </a:txBody>
+                  <a:tcPr/>
+                </a:tc>
+                <a:extLst>
+                  <a:ext uri="{0D108BD9-81ED-4DB2-BD59-A6C34878D82A}">
+                    <a16:rowId xmlns:a16="http://schemas.microsoft.com/office/drawing/2014/main" val="746106469"/>
+                  </a:ext>
+                </a:extLst>
+              </a:tr>
+            </a:tbl>
+          </a:graphicData>
+        </a:graphic>
+      </p:graphicFrame>
+    </p:spTree>
+    <p:extLst>
+      <p:ext uri="{BB962C8B-B14F-4D97-AF65-F5344CB8AC3E}">
+        <p14:creationId xmlns:p14="http://schemas.microsoft.com/office/powerpoint/2010/main" val="2234865979"/>
+      </p:ext>
+    </p:extLst>
+  </p:cSld>
+  <p:clrMapOvr>
+    <a:masterClrMapping/>
+  </p:clrMapOvr>
+</p:sld>
+</file>
+
+<file path=ppt/slides/slide11.xml><?xml version="1.0" encoding="utf-8"?>
+<p:sld xmlns:a="http://schemas.openxmlformats.org/drawingml/2006/main" xmlns:r="http://schemas.openxmlformats.org/officeDocument/2006/relationships" xmlns:p="http://schemas.openxmlformats.org/presentationml/2006/main">
+  <p:cSld>
+    <p:spTree>
+      <p:nvGrpSpPr>
+        <p:cNvPr id="1" name=""/>
+        <p:cNvGrpSpPr/>
+        <p:nvPr/>
+      </p:nvGrpSpPr>
+      <p:grpSpPr>
+        <a:xfrm>
+          <a:off x="0" y="0"/>
+          <a:ext cx="0" cy="0"/>
+          <a:chOff x="0" y="0"/>
+          <a:chExt cx="0" cy="0"/>
+        </a:xfrm>
+      </p:grpSpPr>
+      <p:sp>
+        <p:nvSpPr>
+          <p:cNvPr id="2" name="Titolo 1">
+            <a:extLst>
+              <a:ext uri="{FF2B5EF4-FFF2-40B4-BE49-F238E27FC236}">
                 <a16:creationId xmlns:a16="http://schemas.microsoft.com/office/drawing/2014/main" id="{E57A1EED-342D-C841-807B-6612B7AA446E}"/>
               </a:ext>
             </a:extLst>
@@ -22202,6 +23130,103 @@
           <p:cNvPr id="2" name="Titolo 1">
             <a:extLst>
               <a:ext uri="{FF2B5EF4-FFF2-40B4-BE49-F238E27FC236}">
+                <a16:creationId xmlns:a16="http://schemas.microsoft.com/office/drawing/2014/main" id="{F63C4E6B-20B4-C745-ADA9-56053A9EEE9C}"/>
+              </a:ext>
+            </a:extLst>
+          </p:cNvPr>
+          <p:cNvSpPr>
+            <a:spLocks noGrp="1"/>
+          </p:cNvSpPr>
+          <p:nvPr>
+            <p:ph type="title"/>
+          </p:nvPr>
+        </p:nvSpPr>
+        <p:spPr/>
+        <p:txBody>
+          <a:bodyPr/>
+          <a:lstStyle/>
+          <a:p>
+            <a:r>
+              <a:rPr lang="it-IT" dirty="0"/>
+              <a:t>Assunzioni fatte 4</a:t>
+            </a:r>
+          </a:p>
+        </p:txBody>
+      </p:sp>
+      <p:sp>
+        <p:nvSpPr>
+          <p:cNvPr id="3" name="Segnaposto contenuto 2">
+            <a:extLst>
+              <a:ext uri="{FF2B5EF4-FFF2-40B4-BE49-F238E27FC236}">
+                <a16:creationId xmlns:a16="http://schemas.microsoft.com/office/drawing/2014/main" id="{A665484B-8A6D-E54A-B44E-E340A13C49EB}"/>
+              </a:ext>
+            </a:extLst>
+          </p:cNvPr>
+          <p:cNvSpPr>
+            <a:spLocks noGrp="1"/>
+          </p:cNvSpPr>
+          <p:nvPr>
+            <p:ph idx="1"/>
+          </p:nvPr>
+        </p:nvSpPr>
+        <p:spPr/>
+        <p:txBody>
+          <a:bodyPr/>
+          <a:lstStyle/>
+          <a:p>
+            <a:r>
+              <a:rPr lang="it-IT" dirty="0"/>
+              <a:t>Se produco meno di quello che vendo si pensa che ci sia un magazzino col prodotto già disponibile e quindi come quantità si prende il numero di pezzi prodotti.</a:t>
+            </a:r>
+          </a:p>
+          <a:p>
+            <a:r>
+              <a:rPr lang="it-IT" dirty="0"/>
+              <a:t>Se invece produco di più di quello che vendo si assume che ci sia un surplus della produzione per fare magazzino / prevenzione errori e quindi per coerenza di scelta  si utilizza come quantità per calcolare i costi il numero di </a:t>
+            </a:r>
+            <a:r>
+              <a:rPr lang="it-IT"/>
+              <a:t>pezzi prodotti.</a:t>
+            </a:r>
+            <a:endParaRPr lang="it-IT" dirty="0"/>
+          </a:p>
+        </p:txBody>
+      </p:sp>
+    </p:spTree>
+    <p:extLst>
+      <p:ext uri="{BB962C8B-B14F-4D97-AF65-F5344CB8AC3E}">
+        <p14:creationId xmlns:p14="http://schemas.microsoft.com/office/powerpoint/2010/main" val="3308473382"/>
+      </p:ext>
+    </p:extLst>
+  </p:cSld>
+  <p:clrMapOvr>
+    <a:masterClrMapping/>
+  </p:clrMapOvr>
+</p:sld>
+</file>
+
+<file path=ppt/slides/slide9.xml><?xml version="1.0" encoding="utf-8"?>
+<p:sld xmlns:a="http://schemas.openxmlformats.org/drawingml/2006/main" xmlns:r="http://schemas.openxmlformats.org/officeDocument/2006/relationships" xmlns:p="http://schemas.openxmlformats.org/presentationml/2006/main">
+  <p:cSld>
+    <p:spTree>
+      <p:nvGrpSpPr>
+        <p:cNvPr id="1" name=""/>
+        <p:cNvGrpSpPr/>
+        <p:nvPr/>
+      </p:nvGrpSpPr>
+      <p:grpSpPr>
+        <a:xfrm>
+          <a:off x="0" y="0"/>
+          <a:ext cx="0" cy="0"/>
+          <a:chOff x="0" y="0"/>
+          <a:chExt cx="0" cy="0"/>
+        </a:xfrm>
+      </p:grpSpPr>
+      <p:sp>
+        <p:nvSpPr>
+          <p:cNvPr id="2" name="Titolo 1">
+            <a:extLst>
+              <a:ext uri="{FF2B5EF4-FFF2-40B4-BE49-F238E27FC236}">
                 <a16:creationId xmlns:a16="http://schemas.microsoft.com/office/drawing/2014/main" id="{C78AC4AC-88F8-4747-9F0D-D322C5D35F24}"/>
               </a:ext>
             </a:extLst>
@@ -22280,933 +23305,6 @@
     <p:extLst>
       <p:ext uri="{BB962C8B-B14F-4D97-AF65-F5344CB8AC3E}">
         <p14:creationId xmlns:p14="http://schemas.microsoft.com/office/powerpoint/2010/main" val="3938998553"/>
-      </p:ext>
-    </p:extLst>
-  </p:cSld>
-  <p:clrMapOvr>
-    <a:masterClrMapping/>
-  </p:clrMapOvr>
-</p:sld>
-</file>
-
-<file path=ppt/slides/slide9.xml><?xml version="1.0" encoding="utf-8"?>
-<p:sld xmlns:a="http://schemas.openxmlformats.org/drawingml/2006/main" xmlns:r="http://schemas.openxmlformats.org/officeDocument/2006/relationships" xmlns:p="http://schemas.openxmlformats.org/presentationml/2006/main">
-  <p:cSld>
-    <p:spTree>
-      <p:nvGrpSpPr>
-        <p:cNvPr id="1" name=""/>
-        <p:cNvGrpSpPr/>
-        <p:nvPr/>
-      </p:nvGrpSpPr>
-      <p:grpSpPr>
-        <a:xfrm>
-          <a:off x="0" y="0"/>
-          <a:ext cx="0" cy="0"/>
-          <a:chOff x="0" y="0"/>
-          <a:chExt cx="0" cy="0"/>
-        </a:xfrm>
-      </p:grpSpPr>
-      <p:sp>
-        <p:nvSpPr>
-          <p:cNvPr id="2" name="Titolo 1">
-            <a:extLst>
-              <a:ext uri="{FF2B5EF4-FFF2-40B4-BE49-F238E27FC236}">
-                <a16:creationId xmlns:a16="http://schemas.microsoft.com/office/drawing/2014/main" id="{E73A98B8-1F47-2447-8BE2-E9DF0B1A16D0}"/>
-              </a:ext>
-            </a:extLst>
-          </p:cNvPr>
-          <p:cNvSpPr>
-            <a:spLocks noGrp="1"/>
-          </p:cNvSpPr>
-          <p:nvPr>
-            <p:ph type="title"/>
-          </p:nvPr>
-        </p:nvSpPr>
-        <p:spPr/>
-        <p:txBody>
-          <a:bodyPr/>
-          <a:lstStyle/>
-          <a:p>
-            <a:r>
-              <a:rPr lang="it-IT"/>
-              <a:t>Esecuzione degli scostamenti</a:t>
-            </a:r>
-          </a:p>
-        </p:txBody>
-      </p:sp>
-      <p:graphicFrame>
-        <p:nvGraphicFramePr>
-          <p:cNvPr id="4" name="Tabella 4">
-            <a:extLst>
-              <a:ext uri="{FF2B5EF4-FFF2-40B4-BE49-F238E27FC236}">
-                <a16:creationId xmlns:a16="http://schemas.microsoft.com/office/drawing/2014/main" id="{CB59760C-95C5-0B4C-AD26-423EC055CB2F}"/>
-              </a:ext>
-            </a:extLst>
-          </p:cNvPr>
-          <p:cNvGraphicFramePr>
-            <a:graphicFrameLocks noGrp="1"/>
-          </p:cNvGraphicFramePr>
-          <p:nvPr>
-            <p:ph idx="1"/>
-            <p:extLst>
-              <p:ext uri="{D42A27DB-BD31-4B8C-83A1-F6EECF244321}">
-                <p14:modId xmlns:p14="http://schemas.microsoft.com/office/powerpoint/2010/main" val="628559778"/>
-              </p:ext>
-            </p:extLst>
-          </p:nvPr>
-        </p:nvGraphicFramePr>
-        <p:xfrm>
-          <a:off x="95714" y="1555654"/>
-          <a:ext cx="12000571" cy="4717130"/>
-        </p:xfrm>
-        <a:graphic>
-          <a:graphicData uri="http://schemas.openxmlformats.org/drawingml/2006/table">
-            <a:tbl>
-              <a:tblPr firstRow="1" bandRow="1">
-                <a:tableStyleId>{5C22544A-7EE6-4342-B048-85BDC9FD1C3A}</a:tableStyleId>
-              </a:tblPr>
-              <a:tblGrid>
-                <a:gridCol w="1333397">
-                  <a:extLst>
-                    <a:ext uri="{9D8B030D-6E8A-4147-A177-3AD203B41FA5}">
-                      <a16:colId xmlns:a16="http://schemas.microsoft.com/office/drawing/2014/main" val="3039533413"/>
-                    </a:ext>
-                  </a:extLst>
-                </a:gridCol>
-                <a:gridCol w="1386281">
-                  <a:extLst>
-                    <a:ext uri="{9D8B030D-6E8A-4147-A177-3AD203B41FA5}">
-                      <a16:colId xmlns:a16="http://schemas.microsoft.com/office/drawing/2014/main" val="1628745461"/>
-                    </a:ext>
-                  </a:extLst>
-                </a:gridCol>
-                <a:gridCol w="1280511">
-                  <a:extLst>
-                    <a:ext uri="{9D8B030D-6E8A-4147-A177-3AD203B41FA5}">
-                      <a16:colId xmlns:a16="http://schemas.microsoft.com/office/drawing/2014/main" val="3012836848"/>
-                    </a:ext>
-                  </a:extLst>
-                </a:gridCol>
-                <a:gridCol w="1337176">
-                  <a:extLst>
-                    <a:ext uri="{9D8B030D-6E8A-4147-A177-3AD203B41FA5}">
-                      <a16:colId xmlns:a16="http://schemas.microsoft.com/office/drawing/2014/main" val="3335112797"/>
-                    </a:ext>
-                  </a:extLst>
-                </a:gridCol>
-                <a:gridCol w="1329618">
-                  <a:extLst>
-                    <a:ext uri="{9D8B030D-6E8A-4147-A177-3AD203B41FA5}">
-                      <a16:colId xmlns:a16="http://schemas.microsoft.com/office/drawing/2014/main" val="3262263587"/>
-                    </a:ext>
-                  </a:extLst>
-                </a:gridCol>
-                <a:gridCol w="1390059">
-                  <a:extLst>
-                    <a:ext uri="{9D8B030D-6E8A-4147-A177-3AD203B41FA5}">
-                      <a16:colId xmlns:a16="http://schemas.microsoft.com/office/drawing/2014/main" val="3015288968"/>
-                    </a:ext>
-                  </a:extLst>
-                </a:gridCol>
-                <a:gridCol w="1337174">
-                  <a:extLst>
-                    <a:ext uri="{9D8B030D-6E8A-4147-A177-3AD203B41FA5}">
-                      <a16:colId xmlns:a16="http://schemas.microsoft.com/office/drawing/2014/main" val="3807841347"/>
-                    </a:ext>
-                  </a:extLst>
-                </a:gridCol>
-                <a:gridCol w="1272958">
-                  <a:extLst>
-                    <a:ext uri="{9D8B030D-6E8A-4147-A177-3AD203B41FA5}">
-                      <a16:colId xmlns:a16="http://schemas.microsoft.com/office/drawing/2014/main" val="3378513636"/>
-                    </a:ext>
-                  </a:extLst>
-                </a:gridCol>
-                <a:gridCol w="1333397">
-                  <a:extLst>
-                    <a:ext uri="{9D8B030D-6E8A-4147-A177-3AD203B41FA5}">
-                      <a16:colId xmlns:a16="http://schemas.microsoft.com/office/drawing/2014/main" val="1681983959"/>
-                    </a:ext>
-                  </a:extLst>
-                </a:gridCol>
-              </a:tblGrid>
-              <a:tr h="1149022">
-                <a:tc>
-                  <a:txBody>
-                    <a:bodyPr/>
-                    <a:lstStyle/>
-                    <a:p>
-                      <a:pPr algn="l"/>
-                      <a:endParaRPr lang="it-IT" dirty="0"/>
-                    </a:p>
-                  </a:txBody>
-                  <a:tcPr/>
-                </a:tc>
-                <a:tc>
-                  <a:txBody>
-                    <a:bodyPr/>
-                    <a:lstStyle/>
-                    <a:p>
-                      <a:pPr algn="l"/>
-                      <a:r>
-                        <a:rPr lang="it-IT" dirty="0"/>
-                        <a:t>Budget</a:t>
-                      </a:r>
-                    </a:p>
-                  </a:txBody>
-                  <a:tcPr/>
-                </a:tc>
-                <a:tc>
-                  <a:txBody>
-                    <a:bodyPr/>
-                    <a:lstStyle/>
-                    <a:p>
-                      <a:pPr algn="l"/>
-                      <a:r>
-                        <a:rPr lang="it-IT" dirty="0"/>
-                        <a:t>Scostamento di volume</a:t>
-                      </a:r>
-                    </a:p>
-                  </a:txBody>
-                  <a:tcPr/>
-                </a:tc>
-                <a:tc>
-                  <a:txBody>
-                    <a:bodyPr/>
-                    <a:lstStyle/>
-                    <a:p>
-                      <a:pPr algn="l"/>
-                      <a:r>
-                        <a:rPr lang="it-IT" dirty="0"/>
-                        <a:t>Standard</a:t>
-                      </a:r>
-                    </a:p>
-                  </a:txBody>
-                  <a:tcPr/>
-                </a:tc>
-                <a:tc>
-                  <a:txBody>
-                    <a:bodyPr/>
-                    <a:lstStyle/>
-                    <a:p>
-                      <a:pPr algn="l"/>
-                      <a:r>
-                        <a:rPr lang="it-IT" dirty="0"/>
-                        <a:t>Scostamento di impiego/MIX</a:t>
-                      </a:r>
-                    </a:p>
-                  </a:txBody>
-                  <a:tcPr/>
-                </a:tc>
-                <a:tc>
-                  <a:txBody>
-                    <a:bodyPr/>
-                    <a:lstStyle/>
-                    <a:p>
-                      <a:pPr algn="l"/>
-                      <a:r>
-                        <a:rPr lang="it-IT" dirty="0"/>
-                        <a:t>Effettivo</a:t>
-                      </a:r>
-                    </a:p>
-                  </a:txBody>
-                  <a:tcPr/>
-                </a:tc>
-                <a:tc>
-                  <a:txBody>
-                    <a:bodyPr/>
-                    <a:lstStyle/>
-                    <a:p>
-                      <a:pPr algn="l"/>
-                      <a:r>
-                        <a:rPr lang="it-IT" dirty="0"/>
-                        <a:t>Scostamento di prezzo</a:t>
-                      </a:r>
-                    </a:p>
-                  </a:txBody>
-                  <a:tcPr/>
-                </a:tc>
-                <a:tc>
-                  <a:txBody>
-                    <a:bodyPr/>
-                    <a:lstStyle/>
-                    <a:p>
-                      <a:pPr algn="l"/>
-                      <a:r>
-                        <a:rPr lang="it-IT" dirty="0"/>
-                        <a:t>Consuntivo</a:t>
-                      </a:r>
-                    </a:p>
-                  </a:txBody>
-                  <a:tcPr/>
-                </a:tc>
-                <a:tc>
-                  <a:txBody>
-                    <a:bodyPr/>
-                    <a:lstStyle/>
-                    <a:p>
-                      <a:pPr algn="l"/>
-                      <a:r>
-                        <a:rPr lang="it-IT"/>
-                        <a:t>Scostamento consuntivo- budget</a:t>
-                      </a:r>
-                      <a:endParaRPr lang="it-IT" dirty="0"/>
-                    </a:p>
-                  </a:txBody>
-                  <a:tcPr/>
-                </a:tc>
-                <a:extLst>
-                  <a:ext uri="{0D108BD9-81ED-4DB2-BD59-A6C34878D82A}">
-                    <a16:rowId xmlns:a16="http://schemas.microsoft.com/office/drawing/2014/main" val="3282615153"/>
-                  </a:ext>
-                </a:extLst>
-              </a:tr>
-              <a:tr h="730300">
-                <a:tc>
-                  <a:txBody>
-                    <a:bodyPr/>
-                    <a:lstStyle/>
-                    <a:p>
-                      <a:pPr algn="l"/>
-                      <a:r>
-                        <a:rPr lang="it-IT"/>
-                        <a:t>Vendite</a:t>
-                      </a:r>
-                      <a:endParaRPr lang="it-IT" dirty="0"/>
-                    </a:p>
-                  </a:txBody>
-                  <a:tcPr/>
-                </a:tc>
-                <a:tc>
-                  <a:txBody>
-                    <a:bodyPr/>
-                    <a:lstStyle/>
-                    <a:p>
-                      <a:pPr algn="l"/>
-                      <a:r>
-                        <a:rPr lang="it-IT" dirty="0"/>
-                        <a:t>395.335,89</a:t>
-                      </a:r>
-                    </a:p>
-                  </a:txBody>
-                  <a:tcPr/>
-                </a:tc>
-                <a:tc>
-                  <a:txBody>
-                    <a:bodyPr/>
-                    <a:lstStyle/>
-                    <a:p>
-                      <a:pPr algn="l"/>
-                      <a:r>
-                        <a:rPr lang="it-IT" dirty="0"/>
-                        <a:t>115.196,85</a:t>
-                      </a:r>
-                    </a:p>
-                  </a:txBody>
-                  <a:tcPr/>
-                </a:tc>
-                <a:tc>
-                  <a:txBody>
-                    <a:bodyPr/>
-                    <a:lstStyle/>
-                    <a:p>
-                      <a:pPr algn="l"/>
-                      <a:r>
-                        <a:rPr lang="it-IT" dirty="0"/>
-                        <a:t>510.532, 74</a:t>
-                      </a:r>
-                    </a:p>
-                  </a:txBody>
-                  <a:tcPr/>
-                </a:tc>
-                <a:tc>
-                  <a:txBody>
-                    <a:bodyPr/>
-                    <a:lstStyle/>
-                    <a:p>
-                      <a:pPr algn="l"/>
-                      <a:r>
-                        <a:rPr lang="it-IT" dirty="0"/>
-                        <a:t>28.579,68</a:t>
-                      </a:r>
-                    </a:p>
-                  </a:txBody>
-                  <a:tcPr/>
-                </a:tc>
-                <a:tc>
-                  <a:txBody>
-                    <a:bodyPr/>
-                    <a:lstStyle/>
-                    <a:p>
-                      <a:pPr algn="l"/>
-                      <a:r>
-                        <a:rPr lang="it-IT" dirty="0"/>
-                        <a:t>539.112,42</a:t>
-                      </a:r>
-                    </a:p>
-                  </a:txBody>
-                  <a:tcPr/>
-                </a:tc>
-                <a:tc>
-                  <a:txBody>
-                    <a:bodyPr/>
-                    <a:lstStyle/>
-                    <a:p>
-                      <a:pPr algn="l"/>
-                      <a:r>
-                        <a:rPr lang="it-IT" dirty="0"/>
-                        <a:t>-31.269,58</a:t>
-                      </a:r>
-                    </a:p>
-                  </a:txBody>
-                  <a:tcPr/>
-                </a:tc>
-                <a:tc>
-                  <a:txBody>
-                    <a:bodyPr/>
-                    <a:lstStyle/>
-                    <a:p>
-                      <a:pPr algn="l"/>
-                      <a:r>
-                        <a:rPr lang="it-IT" dirty="0"/>
-                        <a:t>507.842,85</a:t>
-                      </a:r>
-                    </a:p>
-                  </a:txBody>
-                  <a:tcPr/>
-                </a:tc>
-                <a:tc>
-                  <a:txBody>
-                    <a:bodyPr/>
-                    <a:lstStyle/>
-                    <a:p>
-                      <a:pPr algn="l"/>
-                      <a:r>
-                        <a:rPr lang="it-IT" dirty="0"/>
-                        <a:t>112.506,96</a:t>
-                      </a:r>
-                    </a:p>
-                  </a:txBody>
-                  <a:tcPr/>
-                </a:tc>
-                <a:extLst>
-                  <a:ext uri="{0D108BD9-81ED-4DB2-BD59-A6C34878D82A}">
-                    <a16:rowId xmlns:a16="http://schemas.microsoft.com/office/drawing/2014/main" val="1242067950"/>
-                  </a:ext>
-                </a:extLst>
-              </a:tr>
-              <a:tr h="423110">
-                <a:tc>
-                  <a:txBody>
-                    <a:bodyPr/>
-                    <a:lstStyle/>
-                    <a:p>
-                      <a:pPr marL="0" marR="0" lvl="0" indent="0" algn="l" defTabSz="914400" rtl="0" eaLnBrk="1" fontAlgn="auto" latinLnBrk="0" hangingPunct="1">
-                        <a:lnSpc>
-                          <a:spcPct val="100000"/>
-                        </a:lnSpc>
-                        <a:spcBef>
-                          <a:spcPts val="0"/>
-                        </a:spcBef>
-                        <a:spcAft>
-                          <a:spcPts val="0"/>
-                        </a:spcAft>
-                        <a:buClrTx/>
-                        <a:buSzTx/>
-                        <a:buFontTx/>
-                        <a:buNone/>
-                        <a:tabLst/>
-                        <a:defRPr/>
-                      </a:pPr>
-                      <a:r>
-                        <a:rPr lang="it-IT" u="sng"/>
-                        <a:t>Costi</a:t>
-                      </a:r>
-                      <a:endParaRPr lang="it-IT" u="sng" dirty="0"/>
-                    </a:p>
-                  </a:txBody>
-                  <a:tcPr/>
-                </a:tc>
-                <a:tc>
-                  <a:txBody>
-                    <a:bodyPr/>
-                    <a:lstStyle/>
-                    <a:p>
-                      <a:pPr algn="l"/>
-                      <a:endParaRPr lang="it-IT" dirty="0"/>
-                    </a:p>
-                  </a:txBody>
-                  <a:tcPr/>
-                </a:tc>
-                <a:tc>
-                  <a:txBody>
-                    <a:bodyPr/>
-                    <a:lstStyle/>
-                    <a:p>
-                      <a:pPr algn="l"/>
-                      <a:endParaRPr lang="it-IT" dirty="0"/>
-                    </a:p>
-                  </a:txBody>
-                  <a:tcPr/>
-                </a:tc>
-                <a:tc>
-                  <a:txBody>
-                    <a:bodyPr/>
-                    <a:lstStyle/>
-                    <a:p>
-                      <a:pPr algn="l"/>
-                      <a:endParaRPr lang="it-IT" dirty="0"/>
-                    </a:p>
-                  </a:txBody>
-                  <a:tcPr/>
-                </a:tc>
-                <a:tc>
-                  <a:txBody>
-                    <a:bodyPr/>
-                    <a:lstStyle/>
-                    <a:p>
-                      <a:pPr algn="l"/>
-                      <a:endParaRPr lang="it-IT" dirty="0"/>
-                    </a:p>
-                  </a:txBody>
-                  <a:tcPr/>
-                </a:tc>
-                <a:tc>
-                  <a:txBody>
-                    <a:bodyPr/>
-                    <a:lstStyle/>
-                    <a:p>
-                      <a:pPr algn="l"/>
-                      <a:endParaRPr lang="it-IT"/>
-                    </a:p>
-                  </a:txBody>
-                  <a:tcPr/>
-                </a:tc>
-                <a:tc>
-                  <a:txBody>
-                    <a:bodyPr/>
-                    <a:lstStyle/>
-                    <a:p>
-                      <a:pPr algn="l"/>
-                      <a:endParaRPr lang="it-IT"/>
-                    </a:p>
-                  </a:txBody>
-                  <a:tcPr/>
-                </a:tc>
-                <a:tc>
-                  <a:txBody>
-                    <a:bodyPr/>
-                    <a:lstStyle/>
-                    <a:p>
-                      <a:pPr algn="l"/>
-                      <a:endParaRPr lang="it-IT" dirty="0"/>
-                    </a:p>
-                  </a:txBody>
-                  <a:tcPr/>
-                </a:tc>
-                <a:tc>
-                  <a:txBody>
-                    <a:bodyPr/>
-                    <a:lstStyle/>
-                    <a:p>
-                      <a:pPr algn="l"/>
-                      <a:endParaRPr lang="it-IT" dirty="0"/>
-                    </a:p>
-                  </a:txBody>
-                  <a:tcPr/>
-                </a:tc>
-                <a:extLst>
-                  <a:ext uri="{0D108BD9-81ED-4DB2-BD59-A6C34878D82A}">
-                    <a16:rowId xmlns:a16="http://schemas.microsoft.com/office/drawing/2014/main" val="3637592334"/>
-                  </a:ext>
-                </a:extLst>
-              </a:tr>
-              <a:tr h="730300">
-                <a:tc>
-                  <a:txBody>
-                    <a:bodyPr/>
-                    <a:lstStyle/>
-                    <a:p>
-                      <a:pPr algn="l"/>
-                      <a:r>
-                        <a:rPr lang="it-IT"/>
-                        <a:t>Materie prime</a:t>
-                      </a:r>
-                      <a:endParaRPr lang="it-IT" dirty="0"/>
-                    </a:p>
-                  </a:txBody>
-                  <a:tcPr/>
-                </a:tc>
-                <a:tc>
-                  <a:txBody>
-                    <a:bodyPr/>
-                    <a:lstStyle/>
-                    <a:p>
-                      <a:pPr algn="l"/>
-                      <a:r>
-                        <a:rPr lang="it-IT" dirty="0"/>
-                        <a:t>192.206,47</a:t>
-                      </a:r>
-                    </a:p>
-                  </a:txBody>
-                  <a:tcPr/>
-                </a:tc>
-                <a:tc>
-                  <a:txBody>
-                    <a:bodyPr/>
-                    <a:lstStyle/>
-                    <a:p>
-                      <a:pPr algn="l"/>
-                      <a:r>
-                        <a:rPr lang="it-IT" dirty="0"/>
-                        <a:t>700</a:t>
-                      </a:r>
-                    </a:p>
-                  </a:txBody>
-                  <a:tcPr/>
-                </a:tc>
-                <a:tc>
-                  <a:txBody>
-                    <a:bodyPr/>
-                    <a:lstStyle/>
-                    <a:p>
-                      <a:pPr algn="l"/>
-                      <a:r>
-                        <a:rPr lang="it-IT" dirty="0"/>
-                        <a:t>192.906,47</a:t>
-                      </a:r>
-                    </a:p>
-                  </a:txBody>
-                  <a:tcPr/>
-                </a:tc>
-                <a:tc>
-                  <a:txBody>
-                    <a:bodyPr/>
-                    <a:lstStyle/>
-                    <a:p>
-                      <a:pPr algn="l"/>
-                      <a:r>
-                        <a:rPr lang="it-IT" dirty="0"/>
-                        <a:t>80.194,25</a:t>
-                      </a:r>
-                    </a:p>
-                  </a:txBody>
-                  <a:tcPr/>
-                </a:tc>
-                <a:tc>
-                  <a:txBody>
-                    <a:bodyPr/>
-                    <a:lstStyle/>
-                    <a:p>
-                      <a:pPr algn="l"/>
-                      <a:r>
-                        <a:rPr lang="it-IT" dirty="0"/>
-                        <a:t>273.100,72</a:t>
-                      </a:r>
-                    </a:p>
-                  </a:txBody>
-                  <a:tcPr/>
-                </a:tc>
-                <a:tc>
-                  <a:txBody>
-                    <a:bodyPr/>
-                    <a:lstStyle/>
-                    <a:p>
-                      <a:pPr algn="l"/>
-                      <a:r>
-                        <a:rPr lang="it-IT"/>
-                        <a:t> </a:t>
-                      </a:r>
-                      <a:endParaRPr lang="it-IT" dirty="0"/>
-                    </a:p>
-                  </a:txBody>
-                  <a:tcPr/>
-                </a:tc>
-                <a:tc>
-                  <a:txBody>
-                    <a:bodyPr/>
-                    <a:lstStyle/>
-                    <a:p>
-                      <a:pPr algn="l"/>
-                      <a:r>
-                        <a:rPr lang="it-IT" dirty="0"/>
-                        <a:t>289.639,50</a:t>
-                      </a:r>
-                    </a:p>
-                  </a:txBody>
-                  <a:tcPr/>
-                </a:tc>
-                <a:tc>
-                  <a:txBody>
-                    <a:bodyPr/>
-                    <a:lstStyle/>
-                    <a:p>
-                      <a:pPr algn="l"/>
-                      <a:r>
-                        <a:rPr lang="it-IT" dirty="0"/>
-                        <a:t>96.733,03</a:t>
-                      </a:r>
-                    </a:p>
-                  </a:txBody>
-                  <a:tcPr/>
-                </a:tc>
-                <a:extLst>
-                  <a:ext uri="{0D108BD9-81ED-4DB2-BD59-A6C34878D82A}">
-                    <a16:rowId xmlns:a16="http://schemas.microsoft.com/office/drawing/2014/main" val="4251870908"/>
-                  </a:ext>
-                </a:extLst>
-              </a:tr>
-              <a:tr h="730300">
-                <a:tc>
-                  <a:txBody>
-                    <a:bodyPr/>
-                    <a:lstStyle/>
-                    <a:p>
-                      <a:pPr algn="l"/>
-                      <a:r>
-                        <a:rPr lang="it-IT" dirty="0"/>
-                        <a:t>Lavorazioni interne </a:t>
-                      </a:r>
-                    </a:p>
-                  </a:txBody>
-                  <a:tcPr/>
-                </a:tc>
-                <a:tc>
-                  <a:txBody>
-                    <a:bodyPr/>
-                    <a:lstStyle/>
-                    <a:p>
-                      <a:pPr algn="l"/>
-                      <a:r>
-                        <a:rPr lang="it-IT" dirty="0"/>
-                        <a:t>194.521,50</a:t>
-                      </a:r>
-                    </a:p>
-                  </a:txBody>
-                  <a:tcPr/>
-                </a:tc>
-                <a:tc>
-                  <a:txBody>
-                    <a:bodyPr/>
-                    <a:lstStyle/>
-                    <a:p>
-                      <a:pPr algn="l"/>
-                      <a:endParaRPr lang="it-IT" dirty="0"/>
-                    </a:p>
-                  </a:txBody>
-                  <a:tcPr/>
-                </a:tc>
-                <a:tc>
-                  <a:txBody>
-                    <a:bodyPr/>
-                    <a:lstStyle/>
-                    <a:p>
-                      <a:pPr algn="l"/>
-                      <a:r>
-                        <a:rPr lang="it-IT" dirty="0"/>
-                        <a:t>310.199,34 (?)</a:t>
-                      </a:r>
-                    </a:p>
-                  </a:txBody>
-                  <a:tcPr/>
-                </a:tc>
-                <a:tc>
-                  <a:txBody>
-                    <a:bodyPr/>
-                    <a:lstStyle/>
-                    <a:p>
-                      <a:pPr algn="l"/>
-                      <a:endParaRPr lang="it-IT" dirty="0"/>
-                    </a:p>
-                  </a:txBody>
-                  <a:tcPr/>
-                </a:tc>
-                <a:tc>
-                  <a:txBody>
-                    <a:bodyPr/>
-                    <a:lstStyle/>
-                    <a:p>
-                      <a:pPr algn="l"/>
-                      <a:r>
-                        <a:rPr lang="it-IT" dirty="0"/>
-                        <a:t>281.289,91 (?)</a:t>
-                      </a:r>
-                    </a:p>
-                  </a:txBody>
-                  <a:tcPr/>
-                </a:tc>
-                <a:tc>
-                  <a:txBody>
-                    <a:bodyPr/>
-                    <a:lstStyle/>
-                    <a:p>
-                      <a:pPr algn="l"/>
-                      <a:endParaRPr lang="it-IT" dirty="0"/>
-                    </a:p>
-                  </a:txBody>
-                  <a:tcPr/>
-                </a:tc>
-                <a:tc>
-                  <a:txBody>
-                    <a:bodyPr/>
-                    <a:lstStyle/>
-                    <a:p>
-                      <a:pPr algn="l"/>
-                      <a:r>
-                        <a:rPr lang="it-IT"/>
-                        <a:t>359.238,30</a:t>
-                      </a:r>
-                      <a:endParaRPr lang="it-IT" dirty="0"/>
-                    </a:p>
-                  </a:txBody>
-                  <a:tcPr/>
-                </a:tc>
-                <a:tc>
-                  <a:txBody>
-                    <a:bodyPr/>
-                    <a:lstStyle/>
-                    <a:p>
-                      <a:pPr algn="l"/>
-                      <a:r>
-                        <a:rPr lang="it-IT" dirty="0"/>
-                        <a:t>164.716,79</a:t>
-                      </a:r>
-                    </a:p>
-                  </a:txBody>
-                  <a:tcPr/>
-                </a:tc>
-                <a:extLst>
-                  <a:ext uri="{0D108BD9-81ED-4DB2-BD59-A6C34878D82A}">
-                    <a16:rowId xmlns:a16="http://schemas.microsoft.com/office/drawing/2014/main" val="1378050463"/>
-                  </a:ext>
-                </a:extLst>
-              </a:tr>
-              <a:tr h="730300">
-                <a:tc>
-                  <a:txBody>
-                    <a:bodyPr/>
-                    <a:lstStyle/>
-                    <a:p>
-                      <a:pPr algn="l"/>
-                      <a:r>
-                        <a:rPr lang="it-IT" dirty="0"/>
-                        <a:t>MOL </a:t>
-                      </a:r>
-                    </a:p>
-                  </a:txBody>
-                  <a:tcPr/>
-                </a:tc>
-                <a:tc>
-                  <a:txBody>
-                    <a:bodyPr/>
-                    <a:lstStyle/>
-                    <a:p>
-                      <a:pPr algn="l"/>
-                      <a:r>
-                        <a:rPr lang="it-IT" dirty="0"/>
-                        <a:t>7.907,92</a:t>
-                      </a:r>
-                    </a:p>
-                  </a:txBody>
-                  <a:tcPr/>
-                </a:tc>
-                <a:tc>
-                  <a:txBody>
-                    <a:bodyPr/>
-                    <a:lstStyle/>
-                    <a:p>
-                      <a:pPr algn="l"/>
-                      <a:endParaRPr lang="it-IT" dirty="0"/>
-                    </a:p>
-                  </a:txBody>
-                  <a:tcPr/>
-                </a:tc>
-                <a:tc>
-                  <a:txBody>
-                    <a:bodyPr/>
-                    <a:lstStyle/>
-                    <a:p>
-                      <a:pPr algn="l"/>
-                      <a:endParaRPr lang="it-IT" dirty="0"/>
-                    </a:p>
-                  </a:txBody>
-                  <a:tcPr/>
-                </a:tc>
-                <a:tc>
-                  <a:txBody>
-                    <a:bodyPr/>
-                    <a:lstStyle/>
-                    <a:p>
-                      <a:pPr algn="l"/>
-                      <a:endParaRPr lang="it-IT" dirty="0"/>
-                    </a:p>
-                  </a:txBody>
-                  <a:tcPr/>
-                </a:tc>
-                <a:tc>
-                  <a:txBody>
-                    <a:bodyPr/>
-                    <a:lstStyle/>
-                    <a:p>
-                      <a:pPr algn="l"/>
-                      <a:endParaRPr lang="it-IT" dirty="0"/>
-                    </a:p>
-                  </a:txBody>
-                  <a:tcPr/>
-                </a:tc>
-                <a:tc>
-                  <a:txBody>
-                    <a:bodyPr/>
-                    <a:lstStyle/>
-                    <a:p>
-                      <a:pPr algn="l"/>
-                      <a:endParaRPr lang="it-IT" dirty="0"/>
-                    </a:p>
-                  </a:txBody>
-                  <a:tcPr/>
-                </a:tc>
-                <a:tc>
-                  <a:txBody>
-                    <a:bodyPr/>
-                    <a:lstStyle/>
-                    <a:p>
-                      <a:pPr algn="l"/>
-                      <a:r>
-                        <a:rPr lang="it-IT" dirty="0"/>
-                        <a:t>-141.012,55</a:t>
-                      </a:r>
-                    </a:p>
-                  </a:txBody>
-                  <a:tcPr/>
-                </a:tc>
-                <a:tc>
-                  <a:txBody>
-                    <a:bodyPr/>
-                    <a:lstStyle/>
-                    <a:p>
-                      <a:pPr algn="l"/>
-                      <a:r>
-                        <a:rPr lang="it-IT" dirty="0"/>
-                        <a:t>-148.920,36</a:t>
-                      </a:r>
-                    </a:p>
-                  </a:txBody>
-                  <a:tcPr/>
-                </a:tc>
-                <a:extLst>
-                  <a:ext uri="{0D108BD9-81ED-4DB2-BD59-A6C34878D82A}">
-                    <a16:rowId xmlns:a16="http://schemas.microsoft.com/office/drawing/2014/main" val="746106469"/>
-                  </a:ext>
-                </a:extLst>
-              </a:tr>
-            </a:tbl>
-          </a:graphicData>
-        </a:graphic>
-      </p:graphicFrame>
-    </p:spTree>
-    <p:extLst>
-      <p:ext uri="{BB962C8B-B14F-4D97-AF65-F5344CB8AC3E}">
-        <p14:creationId xmlns:p14="http://schemas.microsoft.com/office/powerpoint/2010/main" val="2234865979"/>
       </p:ext>
     </p:extLst>
   </p:cSld>

</xml_diff>

<commit_message>
range per gli scostamenti
</commit_message>
<xml_diff>
--- a/Document/PresentazioneProgetto.pptx
+++ b/Document/PresentazioneProgetto.pptx
@@ -18,8 +18,9 @@
     <p:sldId id="273" r:id="rId12"/>
     <p:sldId id="262" r:id="rId13"/>
     <p:sldId id="270" r:id="rId14"/>
-    <p:sldId id="263" r:id="rId15"/>
-    <p:sldId id="275" r:id="rId16"/>
+    <p:sldId id="276" r:id="rId15"/>
+    <p:sldId id="263" r:id="rId16"/>
+    <p:sldId id="275" r:id="rId17"/>
   </p:sldIdLst>
   <p:sldSz cx="12192000" cy="6858000"/>
   <p:notesSz cx="6858000" cy="9144000"/>
@@ -8919,7 +8920,7 @@
           <a:p>
             <a:fld id="{E73BCDAA-43D9-6A49-A153-143FD6FEACF2}" type="datetimeFigureOut">
               <a:rPr lang="it-IT" smtClean="0"/>
-              <a:t>02/01/22</a:t>
+              <a:t>03/01/22</a:t>
             </a:fld>
             <a:endParaRPr lang="it-IT"/>
           </a:p>
@@ -9126,7 +9127,7 @@
           <a:p>
             <a:fld id="{E73BCDAA-43D9-6A49-A153-143FD6FEACF2}" type="datetimeFigureOut">
               <a:rPr lang="it-IT" smtClean="0"/>
-              <a:t>02/01/22</a:t>
+              <a:t>03/01/22</a:t>
             </a:fld>
             <a:endParaRPr lang="it-IT"/>
           </a:p>
@@ -9306,7 +9307,7 @@
           <a:p>
             <a:fld id="{E73BCDAA-43D9-6A49-A153-143FD6FEACF2}" type="datetimeFigureOut">
               <a:rPr lang="it-IT" smtClean="0"/>
-              <a:t>02/01/22</a:t>
+              <a:t>03/01/22</a:t>
             </a:fld>
             <a:endParaRPr lang="it-IT"/>
           </a:p>
@@ -9511,7 +9512,7 @@
           <a:p>
             <a:fld id="{E73BCDAA-43D9-6A49-A153-143FD6FEACF2}" type="datetimeFigureOut">
               <a:rPr lang="it-IT" smtClean="0"/>
-              <a:t>02/01/22</a:t>
+              <a:t>03/01/22</a:t>
             </a:fld>
             <a:endParaRPr lang="it-IT"/>
           </a:p>
@@ -18409,7 +18410,7 @@
           <a:p>
             <a:fld id="{E73BCDAA-43D9-6A49-A153-143FD6FEACF2}" type="datetimeFigureOut">
               <a:rPr lang="it-IT" smtClean="0"/>
-              <a:t>02/01/22</a:t>
+              <a:t>03/01/22</a:t>
             </a:fld>
             <a:endParaRPr lang="it-IT"/>
           </a:p>
@@ -18683,7 +18684,7 @@
           <a:p>
             <a:fld id="{E73BCDAA-43D9-6A49-A153-143FD6FEACF2}" type="datetimeFigureOut">
               <a:rPr lang="it-IT" smtClean="0"/>
-              <a:t>02/01/22</a:t>
+              <a:t>03/01/22</a:t>
             </a:fld>
             <a:endParaRPr lang="it-IT"/>
           </a:p>
@@ -19086,7 +19087,7 @@
           <a:p>
             <a:fld id="{E73BCDAA-43D9-6A49-A153-143FD6FEACF2}" type="datetimeFigureOut">
               <a:rPr lang="it-IT" smtClean="0"/>
-              <a:t>02/01/22</a:t>
+              <a:t>03/01/22</a:t>
             </a:fld>
             <a:endParaRPr lang="it-IT"/>
           </a:p>
@@ -19209,7 +19210,7 @@
           <a:p>
             <a:fld id="{E73BCDAA-43D9-6A49-A153-143FD6FEACF2}" type="datetimeFigureOut">
               <a:rPr lang="it-IT" smtClean="0"/>
-              <a:t>02/01/22</a:t>
+              <a:t>03/01/22</a:t>
             </a:fld>
             <a:endParaRPr lang="it-IT"/>
           </a:p>
@@ -19304,7 +19305,7 @@
           <a:p>
             <a:fld id="{E73BCDAA-43D9-6A49-A153-143FD6FEACF2}" type="datetimeFigureOut">
               <a:rPr lang="it-IT" smtClean="0"/>
-              <a:t>02/01/22</a:t>
+              <a:t>03/01/22</a:t>
             </a:fld>
             <a:endParaRPr lang="it-IT"/>
           </a:p>
@@ -19594,7 +19595,7 @@
           <a:p>
             <a:fld id="{E73BCDAA-43D9-6A49-A153-143FD6FEACF2}" type="datetimeFigureOut">
               <a:rPr lang="it-IT" smtClean="0"/>
-              <a:t>02/01/22</a:t>
+              <a:t>03/01/22</a:t>
             </a:fld>
             <a:endParaRPr lang="it-IT"/>
           </a:p>
@@ -19879,7 +19880,7 @@
           <a:p>
             <a:fld id="{E73BCDAA-43D9-6A49-A153-143FD6FEACF2}" type="datetimeFigureOut">
               <a:rPr lang="it-IT" smtClean="0"/>
-              <a:t>02/01/22</a:t>
+              <a:t>03/01/22</a:t>
             </a:fld>
             <a:endParaRPr lang="it-IT"/>
           </a:p>
@@ -20129,7 +20130,7 @@
           <a:p>
             <a:fld id="{E73BCDAA-43D9-6A49-A153-143FD6FEACF2}" type="datetimeFigureOut">
               <a:rPr lang="it-IT" smtClean="0"/>
-              <a:t>02/01/22</a:t>
+              <a:t>03/01/22</a:t>
             </a:fld>
             <a:endParaRPr lang="it-IT"/>
           </a:p>
@@ -20941,7 +20942,7 @@
         </p:blipFill>
         <p:spPr>
           <a:xfrm>
-            <a:off x="2154788" y="1779190"/>
+            <a:off x="2154788" y="1678829"/>
             <a:ext cx="7882424" cy="3299619"/>
           </a:xfrm>
         </p:spPr>
@@ -20994,7 +20995,7 @@
         </p:nvSpPr>
         <p:spPr>
           <a:xfrm>
-            <a:off x="95714" y="418230"/>
+            <a:off x="720182" y="529742"/>
             <a:ext cx="12627901" cy="1499616"/>
           </a:xfrm>
         </p:spPr>
@@ -21005,7 +21006,7 @@
           <a:lstStyle/>
           <a:p>
             <a:r>
-              <a:rPr lang="it-IT" sz="4000" dirty="0"/>
+              <a:rPr lang="it-IT" sz="3500" dirty="0"/>
               <a:t>Esecuzione degli scostamenti con prodotti intermedi considerati</a:t>
             </a:r>
           </a:p>
@@ -21163,6 +21164,89 @@
           <p:cNvPr id="2" name="Titolo 1">
             <a:extLst>
               <a:ext uri="{FF2B5EF4-FFF2-40B4-BE49-F238E27FC236}">
+                <a16:creationId xmlns:a16="http://schemas.microsoft.com/office/drawing/2014/main" id="{A24C95E1-D957-1B4A-9F27-CB1E9B8B5979}"/>
+              </a:ext>
+            </a:extLst>
+          </p:cNvPr>
+          <p:cNvSpPr>
+            <a:spLocks noGrp="1"/>
+          </p:cNvSpPr>
+          <p:nvPr>
+            <p:ph type="title"/>
+          </p:nvPr>
+        </p:nvSpPr>
+        <p:spPr/>
+        <p:txBody>
+          <a:bodyPr/>
+          <a:lstStyle/>
+          <a:p>
+            <a:r>
+              <a:rPr lang="it-IT" dirty="0"/>
+              <a:t>Confronto dei risultati ottenuti</a:t>
+            </a:r>
+          </a:p>
+        </p:txBody>
+      </p:sp>
+      <p:sp>
+        <p:nvSpPr>
+          <p:cNvPr id="3" name="Segnaposto contenuto 2">
+            <a:extLst>
+              <a:ext uri="{FF2B5EF4-FFF2-40B4-BE49-F238E27FC236}">
+                <a16:creationId xmlns:a16="http://schemas.microsoft.com/office/drawing/2014/main" id="{C358E696-37B9-3546-A1DC-ED7B6669B13D}"/>
+              </a:ext>
+            </a:extLst>
+          </p:cNvPr>
+          <p:cNvSpPr>
+            <a:spLocks noGrp="1"/>
+          </p:cNvSpPr>
+          <p:nvPr>
+            <p:ph idx="1"/>
+          </p:nvPr>
+        </p:nvSpPr>
+        <p:spPr/>
+        <p:txBody>
+          <a:bodyPr/>
+          <a:lstStyle/>
+          <a:p>
+            <a:endParaRPr lang="it-IT"/>
+          </a:p>
+        </p:txBody>
+      </p:sp>
+    </p:spTree>
+    <p:extLst>
+      <p:ext uri="{BB962C8B-B14F-4D97-AF65-F5344CB8AC3E}">
+        <p14:creationId xmlns:p14="http://schemas.microsoft.com/office/powerpoint/2010/main" val="372275822"/>
+      </p:ext>
+    </p:extLst>
+  </p:cSld>
+  <p:clrMapOvr>
+    <a:masterClrMapping/>
+  </p:clrMapOvr>
+</p:sld>
+</file>
+
+<file path=ppt/slides/slide15.xml><?xml version="1.0" encoding="utf-8"?>
+<p:sld xmlns:a="http://schemas.openxmlformats.org/drawingml/2006/main" xmlns:r="http://schemas.openxmlformats.org/officeDocument/2006/relationships" xmlns:p="http://schemas.openxmlformats.org/presentationml/2006/main">
+  <p:cSld>
+    <p:spTree>
+      <p:nvGrpSpPr>
+        <p:cNvPr id="1" name=""/>
+        <p:cNvGrpSpPr/>
+        <p:nvPr/>
+      </p:nvGrpSpPr>
+      <p:grpSpPr>
+        <a:xfrm>
+          <a:off x="0" y="0"/>
+          <a:ext cx="0" cy="0"/>
+          <a:chOff x="0" y="0"/>
+          <a:chExt cx="0" cy="0"/>
+        </a:xfrm>
+      </p:grpSpPr>
+      <p:sp>
+        <p:nvSpPr>
+          <p:cNvPr id="2" name="Titolo 1">
+            <a:extLst>
+              <a:ext uri="{FF2B5EF4-FFF2-40B4-BE49-F238E27FC236}">
                 <a16:creationId xmlns:a16="http://schemas.microsoft.com/office/drawing/2014/main" id="{E57A1EED-342D-C841-807B-6612B7AA446E}"/>
               </a:ext>
             </a:extLst>
@@ -21287,7 +21371,7 @@
 </p:sld>
 </file>
 
-<file path=ppt/slides/slide15.xml><?xml version="1.0" encoding="utf-8"?>
+<file path=ppt/slides/slide16.xml><?xml version="1.0" encoding="utf-8"?>
 <p:sld xmlns:a="http://schemas.openxmlformats.org/drawingml/2006/main" xmlns:r="http://schemas.openxmlformats.org/officeDocument/2006/relationships" xmlns:p="http://schemas.openxmlformats.org/presentationml/2006/main">
   <p:cSld>
     <p:spTree>
@@ -21326,8 +21410,12 @@
           <a:lstStyle/>
           <a:p>
             <a:r>
+              <a:rPr lang="it-IT" dirty="0" err="1"/>
+              <a:t>Range</a:t>
+            </a:r>
+            <a:r>
               <a:rPr lang="it-IT" dirty="0"/>
-              <a:t>Principali responsabili degli scostamenti</a:t>
+              <a:t> degli scostamenti</a:t>
             </a:r>
           </a:p>
         </p:txBody>
@@ -21350,7 +21438,9 @@
         </p:nvSpPr>
         <p:spPr/>
         <p:txBody>
-          <a:bodyPr/>
+          <a:bodyPr>
+            <a:normAutofit/>
+          </a:bodyPr>
           <a:lstStyle/>
           <a:p>
             <a:r>
@@ -21363,7 +21453,15 @@
             </a:r>
             <a:r>
               <a:rPr lang="it-IT" dirty="0"/>
-              <a:t> che calcola per ogni articolo tutti gli scostamenti possibili e prende il massimo valore di ogni scostamento e ne salva il numero di articolo. I risultati sono i seguenti: </a:t>
+              <a:t> che calcola per ogni articolo tutti gli scostamenti possibili e costruisce per ogni tipologia di scostamento il </a:t>
+            </a:r>
+            <a:r>
+              <a:rPr lang="it-IT" dirty="0" err="1"/>
+              <a:t>range</a:t>
+            </a:r>
+            <a:r>
+              <a:rPr lang="it-IT" dirty="0"/>
+              <a:t> di scostamento. I risultati sono i seguenti: </a:t>
             </a:r>
           </a:p>
           <a:p>
@@ -21376,26 +21474,16 @@
             <a:endParaRPr lang="it-IT" dirty="0"/>
           </a:p>
           <a:p>
-            <a:r>
-              <a:rPr lang="it-IT" dirty="0"/>
-              <a:t>-Lo scostamento di volume massimo è responsabile di circa il 20% dello scostamento di volume</a:t>
-            </a:r>
-          </a:p>
-          <a:p>
-            <a:r>
-              <a:rPr lang="it-IT"/>
-              <a:t>SCRIVERE IL RESTO DELLE PERCENTUALI</a:t>
-            </a:r>
             <a:endParaRPr lang="it-IT" dirty="0"/>
           </a:p>
         </p:txBody>
       </p:sp>
       <p:pic>
         <p:nvPicPr>
-          <p:cNvPr id="5" name="Immagine 4">
+          <p:cNvPr id="7" name="Immagine 6" descr="Immagine che contiene testo&#10;&#10;Descrizione generata automaticamente">
             <a:extLst>
               <a:ext uri="{FF2B5EF4-FFF2-40B4-BE49-F238E27FC236}">
-                <a16:creationId xmlns:a16="http://schemas.microsoft.com/office/drawing/2014/main" id="{2ED36B86-1D53-AA43-89EF-C2702F8FCCDA}"/>
+                <a16:creationId xmlns:a16="http://schemas.microsoft.com/office/drawing/2014/main" id="{45B402E3-6042-784E-A22F-92A2728BBAC5}"/>
               </a:ext>
             </a:extLst>
           </p:cNvPr>
@@ -21412,46 +21500,14 @@
         </p:blipFill>
         <p:spPr>
           <a:xfrm>
-            <a:off x="1024128" y="3331464"/>
-            <a:ext cx="6781800" cy="1092200"/>
+            <a:off x="1196588" y="3456878"/>
+            <a:ext cx="6832600" cy="1117600"/>
           </a:xfrm>
           <a:prstGeom prst="rect">
             <a:avLst/>
           </a:prstGeom>
         </p:spPr>
       </p:pic>
-      <p:sp>
-        <p:nvSpPr>
-          <p:cNvPr id="6" name="CasellaDiTesto 5">
-            <a:extLst>
-              <a:ext uri="{FF2B5EF4-FFF2-40B4-BE49-F238E27FC236}">
-                <a16:creationId xmlns:a16="http://schemas.microsoft.com/office/drawing/2014/main" id="{5202F135-2161-AF4B-94F1-7CFC0D6460E1}"/>
-              </a:ext>
-            </a:extLst>
-          </p:cNvPr>
-          <p:cNvSpPr txBox="1"/>
-          <p:nvPr/>
-        </p:nvSpPr>
-        <p:spPr>
-          <a:xfrm>
-            <a:off x="8497824" y="4572000"/>
-            <a:ext cx="184731" cy="369332"/>
-          </a:xfrm>
-          <a:prstGeom prst="rect">
-            <a:avLst/>
-          </a:prstGeom>
-          <a:noFill/>
-        </p:spPr>
-        <p:txBody>
-          <a:bodyPr wrap="none" rtlCol="0">
-            <a:spAutoFit/>
-          </a:bodyPr>
-          <a:lstStyle/>
-          <a:p>
-            <a:endParaRPr lang="it-IT" dirty="0"/>
-          </a:p>
-        </p:txBody>
-      </p:sp>
     </p:spTree>
     <p:extLst>
       <p:ext uri="{BB962C8B-B14F-4D97-AF65-F5344CB8AC3E}">

</xml_diff>